<commit_message>
January 2025 Haya Changes
</commit_message>
<xml_diff>
--- a/instructors/03_Being_FAIR_v2.0.pptx
+++ b/instructors/03_Being_FAIR_v2.0.pptx
@@ -21,9 +21,10 @@
     <p:sldId id="274" r:id="rId15"/>
     <p:sldId id="273" r:id="rId16"/>
     <p:sldId id="276" r:id="rId17"/>
-    <p:sldId id="266" r:id="rId18"/>
-    <p:sldId id="277" r:id="rId19"/>
-    <p:sldId id="278" r:id="rId20"/>
+    <p:sldId id="281" r:id="rId18"/>
+    <p:sldId id="266" r:id="rId19"/>
+    <p:sldId id="277" r:id="rId20"/>
+    <p:sldId id="278" r:id="rId21"/>
   </p:sldIdLst>
   <p:sldSz cx="12192000" cy="6858000"/>
   <p:notesSz cx="6858000" cy="9144000"/>
@@ -296,7 +297,7 @@
             <a:fld id="{DE72BEAC-A25F-4480-8AFC-1D3E290F2CC8}" type="datetimeFigureOut">
               <a:rPr lang="en-GB" smtClean="0"/>
               <a:pPr/>
-              <a:t>28/03/2023</a:t>
+              <a:t>14/01/2025</a:t>
             </a:fld>
             <a:endParaRPr lang="en-GB"/>
           </a:p>
@@ -560,7 +561,7 @@
           <a:p>
             <a:fld id="{DE72BEAC-A25F-4480-8AFC-1D3E290F2CC8}" type="datetimeFigureOut">
               <a:rPr lang="en-GB" smtClean="0"/>
-              <a:t>28/03/2023</a:t>
+              <a:t>14/01/2025</a:t>
             </a:fld>
             <a:endParaRPr lang="en-GB"/>
           </a:p>
@@ -770,7 +771,7 @@
           <a:p>
             <a:fld id="{DE72BEAC-A25F-4480-8AFC-1D3E290F2CC8}" type="datetimeFigureOut">
               <a:rPr lang="en-GB" smtClean="0"/>
-              <a:t>28/03/2023</a:t>
+              <a:t>14/01/2025</a:t>
             </a:fld>
             <a:endParaRPr lang="en-GB"/>
           </a:p>
@@ -970,7 +971,7 @@
           <a:p>
             <a:fld id="{DE72BEAC-A25F-4480-8AFC-1D3E290F2CC8}" type="datetimeFigureOut">
               <a:rPr lang="en-GB" smtClean="0"/>
-              <a:t>28/03/2023</a:t>
+              <a:t>14/01/2025</a:t>
             </a:fld>
             <a:endParaRPr lang="en-GB"/>
           </a:p>
@@ -1246,7 +1247,7 @@
           <a:p>
             <a:fld id="{DE72BEAC-A25F-4480-8AFC-1D3E290F2CC8}" type="datetimeFigureOut">
               <a:rPr lang="en-GB" smtClean="0"/>
-              <a:t>28/03/2023</a:t>
+              <a:t>14/01/2025</a:t>
             </a:fld>
             <a:endParaRPr lang="en-GB"/>
           </a:p>
@@ -1514,7 +1515,7 @@
           <a:p>
             <a:fld id="{DE72BEAC-A25F-4480-8AFC-1D3E290F2CC8}" type="datetimeFigureOut">
               <a:rPr lang="en-GB" smtClean="0"/>
-              <a:t>28/03/2023</a:t>
+              <a:t>14/01/2025</a:t>
             </a:fld>
             <a:endParaRPr lang="en-GB"/>
           </a:p>
@@ -1929,7 +1930,7 @@
           <a:p>
             <a:fld id="{DE72BEAC-A25F-4480-8AFC-1D3E290F2CC8}" type="datetimeFigureOut">
               <a:rPr lang="en-GB" smtClean="0"/>
-              <a:t>28/03/2023</a:t>
+              <a:t>14/01/2025</a:t>
             </a:fld>
             <a:endParaRPr lang="en-GB"/>
           </a:p>
@@ -2071,7 +2072,7 @@
           <a:p>
             <a:fld id="{DE72BEAC-A25F-4480-8AFC-1D3E290F2CC8}" type="datetimeFigureOut">
               <a:rPr lang="en-GB" smtClean="0"/>
-              <a:t>28/03/2023</a:t>
+              <a:t>14/01/2025</a:t>
             </a:fld>
             <a:endParaRPr lang="en-GB"/>
           </a:p>
@@ -2184,7 +2185,7 @@
           <a:p>
             <a:fld id="{DE72BEAC-A25F-4480-8AFC-1D3E290F2CC8}" type="datetimeFigureOut">
               <a:rPr lang="en-GB" smtClean="0"/>
-              <a:t>28/03/2023</a:t>
+              <a:t>14/01/2025</a:t>
             </a:fld>
             <a:endParaRPr lang="en-GB"/>
           </a:p>
@@ -2497,7 +2498,7 @@
           <a:p>
             <a:fld id="{DE72BEAC-A25F-4480-8AFC-1D3E290F2CC8}" type="datetimeFigureOut">
               <a:rPr lang="en-GB" smtClean="0"/>
-              <a:t>28/03/2023</a:t>
+              <a:t>14/01/2025</a:t>
             </a:fld>
             <a:endParaRPr lang="en-GB"/>
           </a:p>
@@ -2786,7 +2787,7 @@
           <a:p>
             <a:fld id="{DE72BEAC-A25F-4480-8AFC-1D3E290F2CC8}" type="datetimeFigureOut">
               <a:rPr lang="en-GB" smtClean="0"/>
-              <a:t>28/03/2023</a:t>
+              <a:t>14/01/2025</a:t>
             </a:fld>
             <a:endParaRPr lang="en-GB"/>
           </a:p>
@@ -3028,7 +3029,7 @@
             <a:fld id="{DE72BEAC-A25F-4480-8AFC-1D3E290F2CC8}" type="datetimeFigureOut">
               <a:rPr lang="en-GB" smtClean="0"/>
               <a:pPr/>
-              <a:t>28/03/2023</a:t>
+              <a:t>14/01/2025</a:t>
             </a:fld>
             <a:endParaRPr lang="en-GB"/>
           </a:p>
@@ -3716,7 +3717,7 @@
                 <a:hlinkClick r:id="rId2">
                   <a:extLst>
                     <a:ext uri="{A12FA001-AC4F-418D-AE19-62706E023703}">
-                      <ahyp:hlinkClr xmlns="" xmlns:ahyp="http://schemas.microsoft.com/office/drawing/2018/hyperlinkcolor" val="tx"/>
+                      <ahyp:hlinkClr xmlns:ahyp="http://schemas.microsoft.com/office/drawing/2018/hyperlinkcolor" val="tx"/>
                     </a:ext>
                   </a:extLst>
                 </a:hlinkClick>
@@ -3739,7 +3740,7 @@
                 <a:hlinkClick r:id="rId3">
                   <a:extLst>
                     <a:ext uri="{A12FA001-AC4F-418D-AE19-62706E023703}">
-                      <ahyp:hlinkClr xmlns="" xmlns:ahyp="http://schemas.microsoft.com/office/drawing/2018/hyperlinkcolor" val="tx"/>
+                      <ahyp:hlinkClr xmlns:ahyp="http://schemas.microsoft.com/office/drawing/2018/hyperlinkcolor" val="tx"/>
                     </a:ext>
                   </a:extLst>
                 </a:hlinkClick>
@@ -3762,7 +3763,7 @@
                 <a:hlinkClick r:id="rId4">
                   <a:extLst>
                     <a:ext uri="{A12FA001-AC4F-418D-AE19-62706E023703}">
-                      <ahyp:hlinkClr xmlns="" xmlns:ahyp="http://schemas.microsoft.com/office/drawing/2018/hyperlinkcolor" val="tx"/>
+                      <ahyp:hlinkClr xmlns:ahyp="http://schemas.microsoft.com/office/drawing/2018/hyperlinkcolor" val="tx"/>
                     </a:ext>
                   </a:extLst>
                 </a:hlinkClick>
@@ -3785,7 +3786,7 @@
                 <a:hlinkClick r:id="rId5">
                   <a:extLst>
                     <a:ext uri="{A12FA001-AC4F-418D-AE19-62706E023703}">
-                      <ahyp:hlinkClr xmlns="" xmlns:ahyp="http://schemas.microsoft.com/office/drawing/2018/hyperlinkcolor" val="tx"/>
+                      <ahyp:hlinkClr xmlns:ahyp="http://schemas.microsoft.com/office/drawing/2018/hyperlinkcolor" val="tx"/>
                     </a:ext>
                   </a:extLst>
                 </a:hlinkClick>
@@ -3827,7 +3828,7 @@
                 <a:hlinkClick r:id="rId6">
                   <a:extLst>
                     <a:ext uri="{A12FA001-AC4F-418D-AE19-62706E023703}">
-                      <ahyp:hlinkClr xmlns="" xmlns:ahyp="http://schemas.microsoft.com/office/drawing/2018/hyperlinkcolor" val="tx"/>
+                      <ahyp:hlinkClr xmlns:ahyp="http://schemas.microsoft.com/office/drawing/2018/hyperlinkcolor" val="tx"/>
                     </a:ext>
                   </a:extLst>
                 </a:hlinkClick>
@@ -3850,7 +3851,7 @@
                 <a:hlinkClick r:id="rId7">
                   <a:extLst>
                     <a:ext uri="{A12FA001-AC4F-418D-AE19-62706E023703}">
-                      <ahyp:hlinkClr xmlns="" xmlns:ahyp="http://schemas.microsoft.com/office/drawing/2018/hyperlinkcolor" val="tx"/>
+                      <ahyp:hlinkClr xmlns:ahyp="http://schemas.microsoft.com/office/drawing/2018/hyperlinkcolor" val="tx"/>
                     </a:ext>
                   </a:extLst>
                 </a:hlinkClick>
@@ -3873,7 +3874,7 @@
                 <a:hlinkClick r:id="rId8">
                   <a:extLst>
                     <a:ext uri="{A12FA001-AC4F-418D-AE19-62706E023703}">
-                      <ahyp:hlinkClr xmlns="" xmlns:ahyp="http://schemas.microsoft.com/office/drawing/2018/hyperlinkcolor" val="tx"/>
+                      <ahyp:hlinkClr xmlns:ahyp="http://schemas.microsoft.com/office/drawing/2018/hyperlinkcolor" val="tx"/>
                     </a:ext>
                   </a:extLst>
                 </a:hlinkClick>
@@ -4560,7 +4561,7 @@
                 <a14:useLocalDpi xmlns:a14="http://schemas.microsoft.com/office/drawing/2010/main" val="0"/>
               </a:ext>
               <a:ext uri="{96DAC541-7B7A-43D3-8B79-37D633B846F1}">
-                <asvg:svgBlip xmlns="" xmlns:asvg="http://schemas.microsoft.com/office/drawing/2016/SVG/main" r:embed="rId3"/>
+                <asvg:svgBlip xmlns:asvg="http://schemas.microsoft.com/office/drawing/2016/SVG/main" r:embed="rId3"/>
               </a:ext>
             </a:extLst>
           </a:blip>
@@ -4772,7 +4773,7 @@
                 <a14:useLocalDpi xmlns:a14="http://schemas.microsoft.com/office/drawing/2010/main" val="0"/>
               </a:ext>
               <a:ext uri="{96DAC541-7B7A-43D3-8B79-37D633B846F1}">
-                <asvg:svgBlip xmlns="" xmlns:asvg="http://schemas.microsoft.com/office/drawing/2016/SVG/main" r:embed="rId7"/>
+                <asvg:svgBlip xmlns:asvg="http://schemas.microsoft.com/office/drawing/2016/SVG/main" r:embed="rId7"/>
               </a:ext>
             </a:extLst>
           </a:blip>
@@ -4843,13 +4844,8 @@
           <a:p>
             <a:r>
               <a:rPr lang="en-GB" dirty="0"/>
-              <a:t>FAIR </a:t>
-            </a:r>
-            <a:r>
-              <a:rPr lang="en-GB" dirty="0" smtClean="0"/>
-              <a:t>example exercise</a:t>
-            </a:r>
-            <a:endParaRPr lang="en-GB" dirty="0"/>
+              <a:t>FAIR example exercise</a:t>
+            </a:r>
           </a:p>
         </p:txBody>
       </p:sp>
@@ -4881,7 +4877,15 @@
             </a:pPr>
             <a:r>
               <a:rPr lang="en-GB" dirty="0"/>
-              <a:t>…</a:t>
+              <a:t>… </a:t>
+            </a:r>
+            <a:r>
+              <a:rPr lang="en-GB" dirty="0" err="1"/>
+              <a:t>Exercie</a:t>
+            </a:r>
+            <a:r>
+              <a:rPr lang="en-GB" dirty="0"/>
+              <a:t> 2</a:t>
             </a:r>
             <a:endParaRPr lang="pl-PL" dirty="0"/>
           </a:p>
@@ -4905,16 +4909,10 @@
               <a:rPr lang="pl-PL" dirty="0">
                 <a:hlinkClick r:id="rId2"/>
               </a:rPr>
-              <a:t>https://</a:t>
-            </a:r>
-            <a:r>
-              <a:rPr lang="pl-PL" dirty="0" smtClean="0">
-                <a:hlinkClick r:id="rId2"/>
-              </a:rPr>
-              <a:t>doi.org/10.5281/zenodo.6339631</a:t>
-            </a:r>
-            <a:r>
-              <a:rPr lang="en-GB" dirty="0" smtClean="0"/>
+              <a:t>https://doi.org/10.5281/zenodo.6339631</a:t>
+            </a:r>
+            <a:r>
+              <a:rPr lang="en-GB" dirty="0"/>
               <a:t> </a:t>
             </a:r>
             <a:endParaRPr lang="pl-PL" dirty="0"/>
@@ -4980,7 +4978,7 @@
           <p:cNvPr id="2" name="Title 1">
             <a:extLst>
               <a:ext uri="{FF2B5EF4-FFF2-40B4-BE49-F238E27FC236}">
-                <a16:creationId xmlns:a16="http://schemas.microsoft.com/office/drawing/2014/main" id="{775BFE92-9990-4094-B7B2-01514614F16E}"/>
+                <a16:creationId xmlns:a16="http://schemas.microsoft.com/office/drawing/2014/main" id="{9E518C16-7A29-4B7D-A8B6-E904DBF464FE}"/>
               </a:ext>
             </a:extLst>
           </p:cNvPr>
@@ -4996,10 +4994,105 @@
           <a:bodyPr/>
           <a:lstStyle/>
           <a:p>
+            <a:endParaRPr lang="en-GB"/>
+          </a:p>
+        </p:txBody>
+      </p:sp>
+      <p:pic>
+        <p:nvPicPr>
+          <p:cNvPr id="5" name="Content Placeholder 4">
+            <a:extLst>
+              <a:ext uri="{FF2B5EF4-FFF2-40B4-BE49-F238E27FC236}">
+                <a16:creationId xmlns:a16="http://schemas.microsoft.com/office/drawing/2014/main" id="{D547A226-9D05-44E5-B181-088999AA9DD5}"/>
+              </a:ext>
+            </a:extLst>
+          </p:cNvPr>
+          <p:cNvPicPr>
+            <a:picLocks noGrp="1" noChangeAspect="1"/>
+          </p:cNvPicPr>
+          <p:nvPr>
+            <p:ph idx="1"/>
+          </p:nvPr>
+        </p:nvPicPr>
+        <p:blipFill>
+          <a:blip r:embed="rId2">
+            <a:extLst>
+              <a:ext uri="{28A0092B-C50C-407E-A947-70E740481C1C}">
+                <a14:useLocalDpi xmlns:a14="http://schemas.microsoft.com/office/drawing/2010/main" val="0"/>
+              </a:ext>
+            </a:extLst>
+          </a:blip>
+          <a:stretch>
+            <a:fillRect/>
+          </a:stretch>
+        </p:blipFill>
+        <p:spPr>
+          <a:xfrm>
+            <a:off x="3259901" y="159135"/>
+            <a:ext cx="5403652" cy="6539729"/>
+          </a:xfrm>
+        </p:spPr>
+      </p:pic>
+    </p:spTree>
+    <p:extLst>
+      <p:ext uri="{BB962C8B-B14F-4D97-AF65-F5344CB8AC3E}">
+        <p14:creationId xmlns:p14="http://schemas.microsoft.com/office/powerpoint/2010/main" val="346098371"/>
+      </p:ext>
+    </p:extLst>
+  </p:cSld>
+  <p:clrMapOvr>
+    <a:masterClrMapping/>
+  </p:clrMapOvr>
+</p:sld>
+</file>
+
+<file path=ppt/slides/slide18.xml><?xml version="1.0" encoding="utf-8"?>
+<p:sld xmlns:a="http://schemas.openxmlformats.org/drawingml/2006/main" xmlns:r="http://schemas.openxmlformats.org/officeDocument/2006/relationships" xmlns:p="http://schemas.openxmlformats.org/presentationml/2006/main">
+  <p:cSld>
+    <p:spTree>
+      <p:nvGrpSpPr>
+        <p:cNvPr id="1" name=""/>
+        <p:cNvGrpSpPr/>
+        <p:nvPr/>
+      </p:nvGrpSpPr>
+      <p:grpSpPr>
+        <a:xfrm>
+          <a:off x="0" y="0"/>
+          <a:ext cx="0" cy="0"/>
+          <a:chOff x="0" y="0"/>
+          <a:chExt cx="0" cy="0"/>
+        </a:xfrm>
+      </p:grpSpPr>
+      <p:sp>
+        <p:nvSpPr>
+          <p:cNvPr id="2" name="Title 1">
+            <a:extLst>
+              <a:ext uri="{FF2B5EF4-FFF2-40B4-BE49-F238E27FC236}">
+                <a16:creationId xmlns:a16="http://schemas.microsoft.com/office/drawing/2014/main" id="{775BFE92-9990-4094-B7B2-01514614F16E}"/>
+              </a:ext>
+            </a:extLst>
+          </p:cNvPr>
+          <p:cNvSpPr>
+            <a:spLocks noGrp="1"/>
+          </p:cNvSpPr>
+          <p:nvPr>
+            <p:ph type="title"/>
+          </p:nvPr>
+        </p:nvSpPr>
+        <p:spPr/>
+        <p:txBody>
+          <a:bodyPr/>
+          <a:lstStyle/>
+          <a:p>
             <a:r>
               <a:rPr lang="en-GB" dirty="0"/>
-              <a:t>FAIR and You</a:t>
-            </a:r>
+              <a:t>FAIR and You – </a:t>
+            </a:r>
+            <a:r>
+              <a:rPr lang="en-GB" sz="2800" dirty="0"/>
+              <a:t>Exercise 3</a:t>
+            </a:r>
+            <a:endParaRPr lang="en-GB" dirty="0"/>
           </a:p>
         </p:txBody>
       </p:sp>
@@ -5269,7 +5362,7 @@
 </p:sld>
 </file>
 
-<file path=ppt/slides/slide18.xml><?xml version="1.0" encoding="utf-8"?>
+<file path=ppt/slides/slide19.xml><?xml version="1.0" encoding="utf-8"?>
 <p:sld xmlns:a="http://schemas.openxmlformats.org/drawingml/2006/main" xmlns:r="http://schemas.openxmlformats.org/officeDocument/2006/relationships" xmlns:p="http://schemas.openxmlformats.org/presentationml/2006/main">
   <p:cSld>
     <p:spTree>
@@ -5393,13 +5486,15 @@
 </p:sld>
 </file>
 
-<file path=ppt/slides/slide19.xml><?xml version="1.0" encoding="utf-8"?>
+<file path=ppt/slides/slide2.xml><?xml version="1.0" encoding="utf-8"?>
 <p:sld xmlns:a="http://schemas.openxmlformats.org/drawingml/2006/main" xmlns:r="http://schemas.openxmlformats.org/officeDocument/2006/relationships" xmlns:p="http://schemas.openxmlformats.org/presentationml/2006/main">
   <p:cSld>
     <p:bg>
       <p:bgPr>
         <a:solidFill>
-          <a:schemeClr val="bg1"/>
+          <a:schemeClr val="bg1">
+            <a:alpha val="0"/>
+          </a:schemeClr>
         </a:solidFill>
         <a:effectLst/>
       </p:bgPr>
@@ -5420,13 +5515,13 @@
       </p:grpSpPr>
       <p:sp useBgFill="1">
         <p:nvSpPr>
-          <p:cNvPr id="10" name="Rectangle 9">
-            <a:extLst>
-              <a:ext uri="{FF2B5EF4-FFF2-40B4-BE49-F238E27FC236}">
-                <a16:creationId xmlns:a16="http://schemas.microsoft.com/office/drawing/2014/main" id="{91F32EBA-ED97-466E-8CFA-8382584155D0}"/>
+          <p:cNvPr id="14" name="Rectangle 13">
+            <a:extLst>
+              <a:ext uri="{FF2B5EF4-FFF2-40B4-BE49-F238E27FC236}">
+                <a16:creationId xmlns:a16="http://schemas.microsoft.com/office/drawing/2014/main" id="{C4E4288A-DFC8-40A2-90E5-70E851A933AD}"/>
               </a:ext>
               <a:ext uri="{C183D7F6-B498-43B3-948B-1728B52AA6E4}">
-                <adec:decorative xmlns="" xmlns:adec="http://schemas.microsoft.com/office/drawing/2017/decorative" val="1"/>
+                <adec:decorative xmlns:adec="http://schemas.microsoft.com/office/drawing/2017/decorative" val="1"/>
               </a:ext>
             </a:extLst>
           </p:cNvPr>
@@ -5474,6 +5569,1423 @@
           <a:lstStyle/>
           <a:p>
             <a:pPr algn="ctr"/>
+            <a:endParaRPr lang="en-US" dirty="0"/>
+          </a:p>
+        </p:txBody>
+      </p:sp>
+      <p:sp>
+        <p:nvSpPr>
+          <p:cNvPr id="2" name="Title 1">
+            <a:extLst>
+              <a:ext uri="{FF2B5EF4-FFF2-40B4-BE49-F238E27FC236}">
+                <a16:creationId xmlns:a16="http://schemas.microsoft.com/office/drawing/2014/main" id="{0CA4E17D-5A2A-49B6-8206-1BAA73046333}"/>
+              </a:ext>
+            </a:extLst>
+          </p:cNvPr>
+          <p:cNvSpPr>
+            <a:spLocks noGrp="1"/>
+          </p:cNvSpPr>
+          <p:nvPr>
+            <p:ph type="title"/>
+          </p:nvPr>
+        </p:nvSpPr>
+        <p:spPr>
+          <a:xfrm>
+            <a:off x="991694" y="435547"/>
+            <a:ext cx="5613822" cy="832285"/>
+          </a:xfrm>
+        </p:spPr>
+        <p:txBody>
+          <a:bodyPr anchor="b">
+            <a:normAutofit/>
+          </a:bodyPr>
+          <a:lstStyle/>
+          <a:p>
+            <a:r>
+              <a:rPr lang="en-GB" sz="4000" dirty="0"/>
+              <a:t>What is data</a:t>
+            </a:r>
+          </a:p>
+        </p:txBody>
+      </p:sp>
+      <p:sp>
+        <p:nvSpPr>
+          <p:cNvPr id="16" name="Freeform: Shape 15">
+            <a:extLst>
+              <a:ext uri="{FF2B5EF4-FFF2-40B4-BE49-F238E27FC236}">
+                <a16:creationId xmlns:a16="http://schemas.microsoft.com/office/drawing/2014/main" id="{A94A2FC9-6D19-473C-B868-99FDB2044AA9}"/>
+              </a:ext>
+              <a:ext uri="{C183D7F6-B498-43B3-948B-1728B52AA6E4}">
+                <adec:decorative xmlns:adec="http://schemas.microsoft.com/office/drawing/2017/decorative" val="1"/>
+              </a:ext>
+            </a:extLst>
+          </p:cNvPr>
+          <p:cNvSpPr>
+            <a:spLocks noGrp="1" noRot="1" noChangeAspect="1" noMove="1" noResize="1" noEditPoints="1" noAdjustHandles="1" noChangeArrowheads="1" noChangeShapeType="1" noTextEdit="1"/>
+          </p:cNvSpPr>
+          <p:nvPr>
+            <p:extLst>
+              <p:ext uri="{386F3935-93C4-4BCD-93E2-E3B085C9AB24}">
+                <p16:designElem xmlns:p16="http://schemas.microsoft.com/office/powerpoint/2015/main" val="1"/>
+              </p:ext>
+            </p:extLst>
+          </p:nvPr>
+        </p:nvSpPr>
+        <p:spPr>
+          <a:xfrm>
+            <a:off x="7036077" y="435547"/>
+            <a:ext cx="1969483" cy="1775389"/>
+          </a:xfrm>
+          <a:custGeom>
+            <a:avLst/>
+            <a:gdLst>
+              <a:gd name="connsiteX0" fmla="*/ 530616 w 1859834"/>
+              <a:gd name="connsiteY0" fmla="*/ 0 h 1676546"/>
+              <a:gd name="connsiteX1" fmla="*/ 1331006 w 1859834"/>
+              <a:gd name="connsiteY1" fmla="*/ 0 h 1676546"/>
+              <a:gd name="connsiteX2" fmla="*/ 1445347 w 1859834"/>
+              <a:gd name="connsiteY2" fmla="*/ 65415 h 1676546"/>
+              <a:gd name="connsiteX3" fmla="*/ 1845541 w 1859834"/>
+              <a:gd name="connsiteY3" fmla="*/ 770436 h 1676546"/>
+              <a:gd name="connsiteX4" fmla="*/ 1845541 w 1859834"/>
+              <a:gd name="connsiteY4" fmla="*/ 906111 h 1676546"/>
+              <a:gd name="connsiteX5" fmla="*/ 1445347 w 1859834"/>
+              <a:gd name="connsiteY5" fmla="*/ 1611131 h 1676546"/>
+              <a:gd name="connsiteX6" fmla="*/ 1331006 w 1859834"/>
+              <a:gd name="connsiteY6" fmla="*/ 1676546 h 1676546"/>
+              <a:gd name="connsiteX7" fmla="*/ 530616 w 1859834"/>
+              <a:gd name="connsiteY7" fmla="*/ 1676546 h 1676546"/>
+              <a:gd name="connsiteX8" fmla="*/ 416275 w 1859834"/>
+              <a:gd name="connsiteY8" fmla="*/ 1611131 h 1676546"/>
+              <a:gd name="connsiteX9" fmla="*/ 16080 w 1859834"/>
+              <a:gd name="connsiteY9" fmla="*/ 906111 h 1676546"/>
+              <a:gd name="connsiteX10" fmla="*/ 16080 w 1859834"/>
+              <a:gd name="connsiteY10" fmla="*/ 770436 h 1676546"/>
+              <a:gd name="connsiteX11" fmla="*/ 416275 w 1859834"/>
+              <a:gd name="connsiteY11" fmla="*/ 65415 h 1676546"/>
+              <a:gd name="connsiteX12" fmla="*/ 530616 w 1859834"/>
+              <a:gd name="connsiteY12" fmla="*/ 0 h 1676546"/>
+            </a:gdLst>
+            <a:ahLst/>
+            <a:cxnLst>
+              <a:cxn ang="0">
+                <a:pos x="connsiteX0" y="connsiteY0"/>
+              </a:cxn>
+              <a:cxn ang="0">
+                <a:pos x="connsiteX1" y="connsiteY1"/>
+              </a:cxn>
+              <a:cxn ang="0">
+                <a:pos x="connsiteX2" y="connsiteY2"/>
+              </a:cxn>
+              <a:cxn ang="0">
+                <a:pos x="connsiteX3" y="connsiteY3"/>
+              </a:cxn>
+              <a:cxn ang="0">
+                <a:pos x="connsiteX4" y="connsiteY4"/>
+              </a:cxn>
+              <a:cxn ang="0">
+                <a:pos x="connsiteX5" y="connsiteY5"/>
+              </a:cxn>
+              <a:cxn ang="0">
+                <a:pos x="connsiteX6" y="connsiteY6"/>
+              </a:cxn>
+              <a:cxn ang="0">
+                <a:pos x="connsiteX7" y="connsiteY7"/>
+              </a:cxn>
+              <a:cxn ang="0">
+                <a:pos x="connsiteX8" y="connsiteY8"/>
+              </a:cxn>
+              <a:cxn ang="0">
+                <a:pos x="connsiteX9" y="connsiteY9"/>
+              </a:cxn>
+              <a:cxn ang="0">
+                <a:pos x="connsiteX10" y="connsiteY10"/>
+              </a:cxn>
+              <a:cxn ang="0">
+                <a:pos x="connsiteX11" y="connsiteY11"/>
+              </a:cxn>
+              <a:cxn ang="0">
+                <a:pos x="connsiteX12" y="connsiteY12"/>
+              </a:cxn>
+            </a:cxnLst>
+            <a:rect l="l" t="t" r="r" b="b"/>
+            <a:pathLst>
+              <a:path w="1859834" h="1676546">
+                <a:moveTo>
+                  <a:pt x="530616" y="0"/>
+                </a:moveTo>
+                <a:cubicBezTo>
+                  <a:pt x="1331006" y="0"/>
+                  <a:pt x="1331006" y="0"/>
+                  <a:pt x="1331006" y="0"/>
+                </a:cubicBezTo>
+                <a:cubicBezTo>
+                  <a:pt x="1371502" y="0"/>
+                  <a:pt x="1423909" y="29073"/>
+                  <a:pt x="1445347" y="65415"/>
+                </a:cubicBezTo>
+                <a:cubicBezTo>
+                  <a:pt x="1845541" y="770436"/>
+                  <a:pt x="1845541" y="770436"/>
+                  <a:pt x="1845541" y="770436"/>
+                </a:cubicBezTo>
+                <a:cubicBezTo>
+                  <a:pt x="1864599" y="809200"/>
+                  <a:pt x="1864599" y="867346"/>
+                  <a:pt x="1845541" y="906111"/>
+                </a:cubicBezTo>
+                <a:cubicBezTo>
+                  <a:pt x="1445347" y="1611131"/>
+                  <a:pt x="1445347" y="1611131"/>
+                  <a:pt x="1445347" y="1611131"/>
+                </a:cubicBezTo>
+                <a:cubicBezTo>
+                  <a:pt x="1423909" y="1647474"/>
+                  <a:pt x="1371502" y="1676546"/>
+                  <a:pt x="1331006" y="1676546"/>
+                </a:cubicBezTo>
+                <a:lnTo>
+                  <a:pt x="530616" y="1676546"/>
+                </a:lnTo>
+                <a:cubicBezTo>
+                  <a:pt x="487738" y="1676546"/>
+                  <a:pt x="435332" y="1647474"/>
+                  <a:pt x="416275" y="1611131"/>
+                </a:cubicBezTo>
+                <a:cubicBezTo>
+                  <a:pt x="16080" y="906111"/>
+                  <a:pt x="16080" y="906111"/>
+                  <a:pt x="16080" y="906111"/>
+                </a:cubicBezTo>
+                <a:cubicBezTo>
+                  <a:pt x="-5359" y="867346"/>
+                  <a:pt x="-5359" y="809200"/>
+                  <a:pt x="16080" y="770436"/>
+                </a:cubicBezTo>
+                <a:cubicBezTo>
+                  <a:pt x="416275" y="65415"/>
+                  <a:pt x="416275" y="65415"/>
+                  <a:pt x="416275" y="65415"/>
+                </a:cubicBezTo>
+                <a:cubicBezTo>
+                  <a:pt x="435332" y="29073"/>
+                  <a:pt x="487738" y="0"/>
+                  <a:pt x="530616" y="0"/>
+                </a:cubicBezTo>
+                <a:close/>
+              </a:path>
+            </a:pathLst>
+          </a:custGeom>
+          <a:solidFill>
+            <a:schemeClr val="tx1">
+              <a:lumMod val="50000"/>
+              <a:lumOff val="50000"/>
+              <a:alpha val="15000"/>
+            </a:schemeClr>
+          </a:solidFill>
+          <a:ln>
+            <a:noFill/>
+          </a:ln>
+        </p:spPr>
+        <p:style>
+          <a:lnRef idx="2">
+            <a:schemeClr val="accent1">
+              <a:shade val="50000"/>
+            </a:schemeClr>
+          </a:lnRef>
+          <a:fillRef idx="1">
+            <a:schemeClr val="accent1"/>
+          </a:fillRef>
+          <a:effectRef idx="0">
+            <a:schemeClr val="accent1"/>
+          </a:effectRef>
+          <a:fontRef idx="minor">
+            <a:schemeClr val="lt1"/>
+          </a:fontRef>
+        </p:style>
+        <p:txBody>
+          <a:bodyPr wrap="square" rtlCol="0" anchor="ctr">
+            <a:noAutofit/>
+          </a:bodyPr>
+          <a:lstStyle/>
+          <a:p>
+            <a:pPr algn="ctr"/>
+            <a:endParaRPr lang="en-US" dirty="0"/>
+          </a:p>
+        </p:txBody>
+      </p:sp>
+      <p:pic>
+        <p:nvPicPr>
+          <p:cNvPr id="9" name="Graphic 8" descr="Cmd Terminal outline">
+            <a:extLst>
+              <a:ext uri="{FF2B5EF4-FFF2-40B4-BE49-F238E27FC236}">
+                <a16:creationId xmlns:a16="http://schemas.microsoft.com/office/drawing/2014/main" id="{717637AA-34EE-CC49-820A-C3D9BE67B952}"/>
+              </a:ext>
+            </a:extLst>
+          </p:cNvPr>
+          <p:cNvPicPr>
+            <a:picLocks noChangeAspect="1"/>
+          </p:cNvPicPr>
+          <p:nvPr/>
+        </p:nvPicPr>
+        <p:blipFill>
+          <a:blip r:embed="rId2" cstate="hqprint">
+            <a:extLst>
+              <a:ext uri="{28A0092B-C50C-407E-A947-70E740481C1C}">
+                <a14:useLocalDpi xmlns:a14="http://schemas.microsoft.com/office/drawing/2010/main" val="0"/>
+              </a:ext>
+              <a:ext uri="{96DAC541-7B7A-43D3-8B79-37D633B846F1}">
+                <asvg:svgBlip xmlns:asvg="http://schemas.microsoft.com/office/drawing/2016/SVG/main" r:embed="rId3"/>
+              </a:ext>
+            </a:extLst>
+          </a:blip>
+          <a:stretch>
+            <a:fillRect/>
+          </a:stretch>
+        </p:blipFill>
+        <p:spPr>
+          <a:xfrm>
+            <a:off x="7542532" y="843530"/>
+            <a:ext cx="956572" cy="956572"/>
+          </a:xfrm>
+          <a:prstGeom prst="rect">
+            <a:avLst/>
+          </a:prstGeom>
+        </p:spPr>
+      </p:pic>
+      <p:sp>
+        <p:nvSpPr>
+          <p:cNvPr id="3" name="Content Placeholder 2">
+            <a:extLst>
+              <a:ext uri="{FF2B5EF4-FFF2-40B4-BE49-F238E27FC236}">
+                <a16:creationId xmlns:a16="http://schemas.microsoft.com/office/drawing/2014/main" id="{81C9C253-9151-4F30-875B-B69CD1772575}"/>
+              </a:ext>
+            </a:extLst>
+          </p:cNvPr>
+          <p:cNvSpPr>
+            <a:spLocks noGrp="1"/>
+          </p:cNvSpPr>
+          <p:nvPr>
+            <p:ph idx="1"/>
+          </p:nvPr>
+        </p:nvSpPr>
+        <p:spPr>
+          <a:xfrm>
+            <a:off x="991693" y="1267832"/>
+            <a:ext cx="5258180" cy="4584961"/>
+          </a:xfrm>
+        </p:spPr>
+        <p:txBody>
+          <a:bodyPr anchor="t">
+            <a:normAutofit fontScale="85000" lnSpcReduction="20000"/>
+          </a:bodyPr>
+          <a:lstStyle/>
+          <a:p>
+            <a:pPr marL="0" indent="0">
+              <a:lnSpc>
+                <a:spcPct val="120000"/>
+              </a:lnSpc>
+              <a:buNone/>
+            </a:pPr>
+            <a:r>
+              <a:rPr lang="en-GB" sz="2400" dirty="0"/>
+              <a:t>Data does not only mean Excel files with recorded measurements from a machine. </a:t>
+            </a:r>
+          </a:p>
+          <a:p>
+            <a:pPr marL="0" indent="0">
+              <a:lnSpc>
+                <a:spcPct val="120000"/>
+              </a:lnSpc>
+              <a:buNone/>
+            </a:pPr>
+            <a:r>
+              <a:rPr lang="en-GB" sz="3000" b="1" dirty="0"/>
+              <a:t>Data also includes:</a:t>
+            </a:r>
+          </a:p>
+          <a:p>
+            <a:pPr>
+              <a:lnSpc>
+                <a:spcPct val="120000"/>
+              </a:lnSpc>
+            </a:pPr>
+            <a:r>
+              <a:rPr lang="en-GB" sz="2400" dirty="0"/>
+              <a:t>images, not only from microscopes</a:t>
+            </a:r>
+          </a:p>
+          <a:p>
+            <a:pPr>
+              <a:lnSpc>
+                <a:spcPct val="120000"/>
+              </a:lnSpc>
+            </a:pPr>
+            <a:r>
+              <a:rPr lang="en-GB" sz="2400" dirty="0"/>
+              <a:t>information about biological materials, like strain or patient details</a:t>
+            </a:r>
+          </a:p>
+          <a:p>
+            <a:pPr>
+              <a:lnSpc>
+                <a:spcPct val="120000"/>
+              </a:lnSpc>
+            </a:pPr>
+            <a:r>
+              <a:rPr lang="en-GB" sz="2400" dirty="0"/>
+              <a:t>recipes, laboratory and measurement protocols</a:t>
+            </a:r>
+            <a:endParaRPr lang="pl-PL" sz="2400" dirty="0"/>
+          </a:p>
+          <a:p>
+            <a:pPr>
+              <a:lnSpc>
+                <a:spcPct val="120000"/>
+              </a:lnSpc>
+            </a:pPr>
+            <a:r>
+              <a:rPr lang="pl-PL" sz="2400" dirty="0"/>
+              <a:t>models</a:t>
+            </a:r>
+            <a:endParaRPr lang="en-GB" sz="2400" dirty="0"/>
+          </a:p>
+          <a:p>
+            <a:pPr>
+              <a:lnSpc>
+                <a:spcPct val="120000"/>
+              </a:lnSpc>
+            </a:pPr>
+            <a:r>
+              <a:rPr lang="en-GB" sz="2400" dirty="0"/>
+              <a:t>scripts, analysis procedures, and custom software are also considered data</a:t>
+            </a:r>
+          </a:p>
+        </p:txBody>
+      </p:sp>
+      <p:sp>
+        <p:nvSpPr>
+          <p:cNvPr id="18" name="Freeform: Shape 17">
+            <a:extLst>
+              <a:ext uri="{FF2B5EF4-FFF2-40B4-BE49-F238E27FC236}">
+                <a16:creationId xmlns:a16="http://schemas.microsoft.com/office/drawing/2014/main" id="{8BED0409-854E-49C4-876E-A78C6D881BC8}"/>
+              </a:ext>
+              <a:ext uri="{C183D7F6-B498-43B3-948B-1728B52AA6E4}">
+                <adec:decorative xmlns:adec="http://schemas.microsoft.com/office/drawing/2017/decorative" val="1"/>
+              </a:ext>
+            </a:extLst>
+          </p:cNvPr>
+          <p:cNvSpPr>
+            <a:spLocks noGrp="1" noRot="1" noChangeAspect="1" noMove="1" noResize="1" noEditPoints="1" noAdjustHandles="1" noChangeArrowheads="1" noChangeShapeType="1" noTextEdit="1"/>
+          </p:cNvSpPr>
+          <p:nvPr>
+            <p:extLst>
+              <p:ext uri="{386F3935-93C4-4BCD-93E2-E3B085C9AB24}">
+                <p16:designElem xmlns:p16="http://schemas.microsoft.com/office/powerpoint/2015/main" val="1"/>
+              </p:ext>
+            </p:extLst>
+          </p:nvPr>
+        </p:nvSpPr>
+        <p:spPr>
+          <a:xfrm>
+            <a:off x="5264329" y="2391339"/>
+            <a:ext cx="4295423" cy="4226565"/>
+          </a:xfrm>
+          <a:custGeom>
+            <a:avLst/>
+            <a:gdLst>
+              <a:gd name="connsiteX0" fmla="*/ 2353286 w 3293367"/>
+              <a:gd name="connsiteY0" fmla="*/ 2104683 h 3240573"/>
+              <a:gd name="connsiteX1" fmla="*/ 2868450 w 3293367"/>
+              <a:gd name="connsiteY1" fmla="*/ 2104683 h 3240573"/>
+              <a:gd name="connsiteX2" fmla="*/ 2892703 w 3293367"/>
+              <a:gd name="connsiteY2" fmla="*/ 2107904 h 3240573"/>
+              <a:gd name="connsiteX3" fmla="*/ 2909383 w 3293367"/>
+              <a:gd name="connsiteY3" fmla="*/ 2114898 h 3240573"/>
+              <a:gd name="connsiteX4" fmla="*/ 2899189 w 3293367"/>
+              <a:gd name="connsiteY4" fmla="*/ 2132529 h 3240573"/>
+              <a:gd name="connsiteX5" fmla="*/ 2538022 w 3293367"/>
+              <a:gd name="connsiteY5" fmla="*/ 2757176 h 3240573"/>
+              <a:gd name="connsiteX6" fmla="*/ 2322847 w 3293367"/>
+              <a:gd name="connsiteY6" fmla="*/ 2882232 h 3240573"/>
+              <a:gd name="connsiteX7" fmla="*/ 2149884 w 3293367"/>
+              <a:gd name="connsiteY7" fmla="*/ 2882232 h 3240573"/>
+              <a:gd name="connsiteX8" fmla="*/ 2129707 w 3293367"/>
+              <a:gd name="connsiteY8" fmla="*/ 2882232 h 3240573"/>
+              <a:gd name="connsiteX9" fmla="*/ 2110453 w 3293367"/>
+              <a:gd name="connsiteY9" fmla="*/ 2849077 h 3240573"/>
+              <a:gd name="connsiteX10" fmla="*/ 2016148 w 3293367"/>
+              <a:gd name="connsiteY10" fmla="*/ 2686675 h 3240573"/>
+              <a:gd name="connsiteX11" fmla="*/ 2016148 w 3293367"/>
+              <a:gd name="connsiteY11" fmla="*/ 2595774 h 3240573"/>
+              <a:gd name="connsiteX12" fmla="*/ 2274287 w 3293367"/>
+              <a:gd name="connsiteY12" fmla="*/ 2151242 h 3240573"/>
+              <a:gd name="connsiteX13" fmla="*/ 2353286 w 3293367"/>
+              <a:gd name="connsiteY13" fmla="*/ 2104683 h 3240573"/>
+              <a:gd name="connsiteX14" fmla="*/ 939150 w 3293367"/>
+              <a:gd name="connsiteY14" fmla="*/ 0 h 3240573"/>
+              <a:gd name="connsiteX15" fmla="*/ 2322847 w 3293367"/>
+              <a:gd name="connsiteY15" fmla="*/ 0 h 3240573"/>
+              <a:gd name="connsiteX16" fmla="*/ 2538022 w 3293367"/>
+              <a:gd name="connsiteY16" fmla="*/ 125055 h 3240573"/>
+              <a:gd name="connsiteX17" fmla="*/ 3228376 w 3293367"/>
+              <a:gd name="connsiteY17" fmla="*/ 1319038 h 3240573"/>
+              <a:gd name="connsiteX18" fmla="*/ 3228376 w 3293367"/>
+              <a:gd name="connsiteY18" fmla="*/ 1563194 h 3240573"/>
+              <a:gd name="connsiteX19" fmla="*/ 2972043 w 3293367"/>
+              <a:gd name="connsiteY19" fmla="*/ 2006528 h 3240573"/>
+              <a:gd name="connsiteX20" fmla="*/ 2950440 w 3293367"/>
+              <a:gd name="connsiteY20" fmla="*/ 2043890 h 3240573"/>
+              <a:gd name="connsiteX21" fmla="*/ 2951200 w 3293367"/>
+              <a:gd name="connsiteY21" fmla="*/ 2044209 h 3240573"/>
+              <a:gd name="connsiteX22" fmla="*/ 2989324 w 3293367"/>
+              <a:gd name="connsiteY22" fmla="*/ 2082660 h 3240573"/>
+              <a:gd name="connsiteX23" fmla="*/ 3279247 w 3293367"/>
+              <a:gd name="connsiteY23" fmla="*/ 2584089 h 3240573"/>
+              <a:gd name="connsiteX24" fmla="*/ 3279247 w 3293367"/>
+              <a:gd name="connsiteY24" fmla="*/ 2686626 h 3240573"/>
+              <a:gd name="connsiteX25" fmla="*/ 2989324 w 3293367"/>
+              <a:gd name="connsiteY25" fmla="*/ 3188054 h 3240573"/>
+              <a:gd name="connsiteX26" fmla="*/ 2898957 w 3293367"/>
+              <a:gd name="connsiteY26" fmla="*/ 3240573 h 3240573"/>
+              <a:gd name="connsiteX27" fmla="*/ 2317855 w 3293367"/>
+              <a:gd name="connsiteY27" fmla="*/ 3240573 h 3240573"/>
+              <a:gd name="connsiteX28" fmla="*/ 2228744 w 3293367"/>
+              <a:gd name="connsiteY28" fmla="*/ 3188054 h 3240573"/>
+              <a:gd name="connsiteX29" fmla="*/ 2072563 w 3293367"/>
+              <a:gd name="connsiteY29" fmla="*/ 2919100 h 3240573"/>
+              <a:gd name="connsiteX30" fmla="*/ 2054920 w 3293367"/>
+              <a:gd name="connsiteY30" fmla="*/ 2888716 h 3240573"/>
+              <a:gd name="connsiteX31" fmla="*/ 2068802 w 3293367"/>
+              <a:gd name="connsiteY31" fmla="*/ 2888716 h 3240573"/>
+              <a:gd name="connsiteX32" fmla="*/ 2134418 w 3293367"/>
+              <a:gd name="connsiteY32" fmla="*/ 2888716 h 3240573"/>
+              <a:gd name="connsiteX33" fmla="*/ 2162922 w 3293367"/>
+              <a:gd name="connsiteY33" fmla="*/ 2937803 h 3240573"/>
+              <a:gd name="connsiteX34" fmla="*/ 2271824 w 3293367"/>
+              <a:gd name="connsiteY34" fmla="*/ 3125340 h 3240573"/>
+              <a:gd name="connsiteX35" fmla="*/ 2350824 w 3293367"/>
+              <a:gd name="connsiteY35" fmla="*/ 3171900 h 3240573"/>
+              <a:gd name="connsiteX36" fmla="*/ 2865989 w 3293367"/>
+              <a:gd name="connsiteY36" fmla="*/ 3171900 h 3240573"/>
+              <a:gd name="connsiteX37" fmla="*/ 2946100 w 3293367"/>
+              <a:gd name="connsiteY37" fmla="*/ 3125340 h 3240573"/>
+              <a:gd name="connsiteX38" fmla="*/ 3203126 w 3293367"/>
+              <a:gd name="connsiteY38" fmla="*/ 2680809 h 3240573"/>
+              <a:gd name="connsiteX39" fmla="*/ 3203126 w 3293367"/>
+              <a:gd name="connsiteY39" fmla="*/ 2589906 h 3240573"/>
+              <a:gd name="connsiteX40" fmla="*/ 2946100 w 3293367"/>
+              <a:gd name="connsiteY40" fmla="*/ 2145375 h 3240573"/>
+              <a:gd name="connsiteX41" fmla="*/ 2912303 w 3293367"/>
+              <a:gd name="connsiteY41" fmla="*/ 2111287 h 3240573"/>
+              <a:gd name="connsiteX42" fmla="*/ 2908392 w 3293367"/>
+              <a:gd name="connsiteY42" fmla="*/ 2109648 h 3240573"/>
+              <a:gd name="connsiteX43" fmla="*/ 2929357 w 3293367"/>
+              <a:gd name="connsiteY43" fmla="*/ 2073390 h 3240573"/>
+              <a:gd name="connsiteX44" fmla="*/ 2944948 w 3293367"/>
+              <a:gd name="connsiteY44" fmla="*/ 2046424 h 3240573"/>
+              <a:gd name="connsiteX45" fmla="*/ 2928777 w 3293367"/>
+              <a:gd name="connsiteY45" fmla="*/ 2039643 h 3240573"/>
+              <a:gd name="connsiteX46" fmla="*/ 2901420 w 3293367"/>
+              <a:gd name="connsiteY46" fmla="*/ 2036009 h 3240573"/>
+              <a:gd name="connsiteX47" fmla="*/ 2320317 w 3293367"/>
+              <a:gd name="connsiteY47" fmla="*/ 2036009 h 3240573"/>
+              <a:gd name="connsiteX48" fmla="*/ 2231207 w 3293367"/>
+              <a:gd name="connsiteY48" fmla="*/ 2088527 h 3240573"/>
+              <a:gd name="connsiteX49" fmla="*/ 1940028 w 3293367"/>
+              <a:gd name="connsiteY49" fmla="*/ 2589956 h 3240573"/>
+              <a:gd name="connsiteX50" fmla="*/ 1940028 w 3293367"/>
+              <a:gd name="connsiteY50" fmla="*/ 2692493 h 3240573"/>
+              <a:gd name="connsiteX51" fmla="*/ 2036139 w 3293367"/>
+              <a:gd name="connsiteY51" fmla="*/ 2858003 h 3240573"/>
+              <a:gd name="connsiteX52" fmla="*/ 2050209 w 3293367"/>
+              <a:gd name="connsiteY52" fmla="*/ 2882232 h 3240573"/>
+              <a:gd name="connsiteX53" fmla="*/ 1985031 w 3293367"/>
+              <a:gd name="connsiteY53" fmla="*/ 2882232 h 3240573"/>
+              <a:gd name="connsiteX54" fmla="*/ 939150 w 3293367"/>
+              <a:gd name="connsiteY54" fmla="*/ 2882232 h 3240573"/>
+              <a:gd name="connsiteX55" fmla="*/ 726963 w 3293367"/>
+              <a:gd name="connsiteY55" fmla="*/ 2757176 h 3240573"/>
+              <a:gd name="connsiteX56" fmla="*/ 33622 w 3293367"/>
+              <a:gd name="connsiteY56" fmla="*/ 1563194 h 3240573"/>
+              <a:gd name="connsiteX57" fmla="*/ 33622 w 3293367"/>
+              <a:gd name="connsiteY57" fmla="*/ 1319038 h 3240573"/>
+              <a:gd name="connsiteX58" fmla="*/ 726963 w 3293367"/>
+              <a:gd name="connsiteY58" fmla="*/ 125055 h 3240573"/>
+              <a:gd name="connsiteX59" fmla="*/ 939150 w 3293367"/>
+              <a:gd name="connsiteY59" fmla="*/ 0 h 3240573"/>
+            </a:gdLst>
+            <a:ahLst/>
+            <a:cxnLst>
+              <a:cxn ang="0">
+                <a:pos x="connsiteX0" y="connsiteY0"/>
+              </a:cxn>
+              <a:cxn ang="0">
+                <a:pos x="connsiteX1" y="connsiteY1"/>
+              </a:cxn>
+              <a:cxn ang="0">
+                <a:pos x="connsiteX2" y="connsiteY2"/>
+              </a:cxn>
+              <a:cxn ang="0">
+                <a:pos x="connsiteX3" y="connsiteY3"/>
+              </a:cxn>
+              <a:cxn ang="0">
+                <a:pos x="connsiteX4" y="connsiteY4"/>
+              </a:cxn>
+              <a:cxn ang="0">
+                <a:pos x="connsiteX5" y="connsiteY5"/>
+              </a:cxn>
+              <a:cxn ang="0">
+                <a:pos x="connsiteX6" y="connsiteY6"/>
+              </a:cxn>
+              <a:cxn ang="0">
+                <a:pos x="connsiteX7" y="connsiteY7"/>
+              </a:cxn>
+              <a:cxn ang="0">
+                <a:pos x="connsiteX8" y="connsiteY8"/>
+              </a:cxn>
+              <a:cxn ang="0">
+                <a:pos x="connsiteX9" y="connsiteY9"/>
+              </a:cxn>
+              <a:cxn ang="0">
+                <a:pos x="connsiteX10" y="connsiteY10"/>
+              </a:cxn>
+              <a:cxn ang="0">
+                <a:pos x="connsiteX11" y="connsiteY11"/>
+              </a:cxn>
+              <a:cxn ang="0">
+                <a:pos x="connsiteX12" y="connsiteY12"/>
+              </a:cxn>
+              <a:cxn ang="0">
+                <a:pos x="connsiteX13" y="connsiteY13"/>
+              </a:cxn>
+              <a:cxn ang="0">
+                <a:pos x="connsiteX14" y="connsiteY14"/>
+              </a:cxn>
+              <a:cxn ang="0">
+                <a:pos x="connsiteX15" y="connsiteY15"/>
+              </a:cxn>
+              <a:cxn ang="0">
+                <a:pos x="connsiteX16" y="connsiteY16"/>
+              </a:cxn>
+              <a:cxn ang="0">
+                <a:pos x="connsiteX17" y="connsiteY17"/>
+              </a:cxn>
+              <a:cxn ang="0">
+                <a:pos x="connsiteX18" y="connsiteY18"/>
+              </a:cxn>
+              <a:cxn ang="0">
+                <a:pos x="connsiteX19" y="connsiteY19"/>
+              </a:cxn>
+              <a:cxn ang="0">
+                <a:pos x="connsiteX20" y="connsiteY20"/>
+              </a:cxn>
+              <a:cxn ang="0">
+                <a:pos x="connsiteX21" y="connsiteY21"/>
+              </a:cxn>
+              <a:cxn ang="0">
+                <a:pos x="connsiteX22" y="connsiteY22"/>
+              </a:cxn>
+              <a:cxn ang="0">
+                <a:pos x="connsiteX23" y="connsiteY23"/>
+              </a:cxn>
+              <a:cxn ang="0">
+                <a:pos x="connsiteX24" y="connsiteY24"/>
+              </a:cxn>
+              <a:cxn ang="0">
+                <a:pos x="connsiteX25" y="connsiteY25"/>
+              </a:cxn>
+              <a:cxn ang="0">
+                <a:pos x="connsiteX26" y="connsiteY26"/>
+              </a:cxn>
+              <a:cxn ang="0">
+                <a:pos x="connsiteX27" y="connsiteY27"/>
+              </a:cxn>
+              <a:cxn ang="0">
+                <a:pos x="connsiteX28" y="connsiteY28"/>
+              </a:cxn>
+              <a:cxn ang="0">
+                <a:pos x="connsiteX29" y="connsiteY29"/>
+              </a:cxn>
+              <a:cxn ang="0">
+                <a:pos x="connsiteX30" y="connsiteY30"/>
+              </a:cxn>
+              <a:cxn ang="0">
+                <a:pos x="connsiteX31" y="connsiteY31"/>
+              </a:cxn>
+              <a:cxn ang="0">
+                <a:pos x="connsiteX32" y="connsiteY32"/>
+              </a:cxn>
+              <a:cxn ang="0">
+                <a:pos x="connsiteX33" y="connsiteY33"/>
+              </a:cxn>
+              <a:cxn ang="0">
+                <a:pos x="connsiteX34" y="connsiteY34"/>
+              </a:cxn>
+              <a:cxn ang="0">
+                <a:pos x="connsiteX35" y="connsiteY35"/>
+              </a:cxn>
+              <a:cxn ang="0">
+                <a:pos x="connsiteX36" y="connsiteY36"/>
+              </a:cxn>
+              <a:cxn ang="0">
+                <a:pos x="connsiteX37" y="connsiteY37"/>
+              </a:cxn>
+              <a:cxn ang="0">
+                <a:pos x="connsiteX38" y="connsiteY38"/>
+              </a:cxn>
+              <a:cxn ang="0">
+                <a:pos x="connsiteX39" y="connsiteY39"/>
+              </a:cxn>
+              <a:cxn ang="0">
+                <a:pos x="connsiteX40" y="connsiteY40"/>
+              </a:cxn>
+              <a:cxn ang="0">
+                <a:pos x="connsiteX41" y="connsiteY41"/>
+              </a:cxn>
+              <a:cxn ang="0">
+                <a:pos x="connsiteX42" y="connsiteY42"/>
+              </a:cxn>
+              <a:cxn ang="0">
+                <a:pos x="connsiteX43" y="connsiteY43"/>
+              </a:cxn>
+              <a:cxn ang="0">
+                <a:pos x="connsiteX44" y="connsiteY44"/>
+              </a:cxn>
+              <a:cxn ang="0">
+                <a:pos x="connsiteX45" y="connsiteY45"/>
+              </a:cxn>
+              <a:cxn ang="0">
+                <a:pos x="connsiteX46" y="connsiteY46"/>
+              </a:cxn>
+              <a:cxn ang="0">
+                <a:pos x="connsiteX47" y="connsiteY47"/>
+              </a:cxn>
+              <a:cxn ang="0">
+                <a:pos x="connsiteX48" y="connsiteY48"/>
+              </a:cxn>
+              <a:cxn ang="0">
+                <a:pos x="connsiteX49" y="connsiteY49"/>
+              </a:cxn>
+              <a:cxn ang="0">
+                <a:pos x="connsiteX50" y="connsiteY50"/>
+              </a:cxn>
+              <a:cxn ang="0">
+                <a:pos x="connsiteX51" y="connsiteY51"/>
+              </a:cxn>
+              <a:cxn ang="0">
+                <a:pos x="connsiteX52" y="connsiteY52"/>
+              </a:cxn>
+              <a:cxn ang="0">
+                <a:pos x="connsiteX53" y="connsiteY53"/>
+              </a:cxn>
+              <a:cxn ang="0">
+                <a:pos x="connsiteX54" y="connsiteY54"/>
+              </a:cxn>
+              <a:cxn ang="0">
+                <a:pos x="connsiteX55" y="connsiteY55"/>
+              </a:cxn>
+              <a:cxn ang="0">
+                <a:pos x="connsiteX56" y="connsiteY56"/>
+              </a:cxn>
+              <a:cxn ang="0">
+                <a:pos x="connsiteX57" y="connsiteY57"/>
+              </a:cxn>
+              <a:cxn ang="0">
+                <a:pos x="connsiteX58" y="connsiteY58"/>
+              </a:cxn>
+              <a:cxn ang="0">
+                <a:pos x="connsiteX59" y="connsiteY59"/>
+              </a:cxn>
+            </a:cxnLst>
+            <a:rect l="l" t="t" r="r" b="b"/>
+            <a:pathLst>
+              <a:path w="3293367" h="3240573">
+                <a:moveTo>
+                  <a:pt x="2353286" y="2104683"/>
+                </a:moveTo>
+                <a:cubicBezTo>
+                  <a:pt x="2353286" y="2104683"/>
+                  <a:pt x="2353286" y="2104683"/>
+                  <a:pt x="2868450" y="2104683"/>
+                </a:cubicBezTo>
+                <a:cubicBezTo>
+                  <a:pt x="2876795" y="2104683"/>
+                  <a:pt x="2884932" y="2105791"/>
+                  <a:pt x="2892703" y="2107904"/>
+                </a:cubicBezTo>
+                <a:lnTo>
+                  <a:pt x="2909383" y="2114898"/>
+                </a:lnTo>
+                <a:lnTo>
+                  <a:pt x="2899189" y="2132529"/>
+                </a:lnTo>
+                <a:cubicBezTo>
+                  <a:pt x="2807017" y="2291942"/>
+                  <a:pt x="2689037" y="2495992"/>
+                  <a:pt x="2538022" y="2757176"/>
+                </a:cubicBezTo>
+                <a:cubicBezTo>
+                  <a:pt x="2493195" y="2834591"/>
+                  <a:pt x="2412503" y="2882232"/>
+                  <a:pt x="2322847" y="2882232"/>
+                </a:cubicBezTo>
+                <a:cubicBezTo>
+                  <a:pt x="2322847" y="2882232"/>
+                  <a:pt x="2322847" y="2882232"/>
+                  <a:pt x="2149884" y="2882232"/>
+                </a:cubicBezTo>
+                <a:lnTo>
+                  <a:pt x="2129707" y="2882232"/>
+                </a:lnTo>
+                <a:lnTo>
+                  <a:pt x="2110453" y="2849077"/>
+                </a:lnTo>
+                <a:cubicBezTo>
+                  <a:pt x="2083644" y="2802909"/>
+                  <a:pt x="2052449" y="2749188"/>
+                  <a:pt x="2016148" y="2686675"/>
+                </a:cubicBezTo>
+                <a:cubicBezTo>
+                  <a:pt x="1999459" y="2658961"/>
+                  <a:pt x="1999459" y="2623488"/>
+                  <a:pt x="2016148" y="2595774"/>
+                </a:cubicBezTo>
+                <a:cubicBezTo>
+                  <a:pt x="2016148" y="2595774"/>
+                  <a:pt x="2016148" y="2595774"/>
+                  <a:pt x="2274287" y="2151242"/>
+                </a:cubicBezTo>
+                <a:cubicBezTo>
+                  <a:pt x="2289865" y="2122420"/>
+                  <a:pt x="2321018" y="2104683"/>
+                  <a:pt x="2353286" y="2104683"/>
+                </a:cubicBezTo>
+                <a:close/>
+                <a:moveTo>
+                  <a:pt x="939150" y="0"/>
+                </a:moveTo>
+                <a:cubicBezTo>
+                  <a:pt x="939150" y="0"/>
+                  <a:pt x="939150" y="0"/>
+                  <a:pt x="2322847" y="0"/>
+                </a:cubicBezTo>
+                <a:cubicBezTo>
+                  <a:pt x="2412503" y="0"/>
+                  <a:pt x="2493195" y="47640"/>
+                  <a:pt x="2538022" y="125055"/>
+                </a:cubicBezTo>
+                <a:cubicBezTo>
+                  <a:pt x="2538022" y="125055"/>
+                  <a:pt x="2538022" y="125055"/>
+                  <a:pt x="3228376" y="1319038"/>
+                </a:cubicBezTo>
+                <a:cubicBezTo>
+                  <a:pt x="3273205" y="1393476"/>
+                  <a:pt x="3273205" y="1488756"/>
+                  <a:pt x="3228376" y="1563194"/>
+                </a:cubicBezTo>
+                <a:cubicBezTo>
+                  <a:pt x="3228376" y="1563194"/>
+                  <a:pt x="3228376" y="1563194"/>
+                  <a:pt x="2972043" y="2006528"/>
+                </a:cubicBezTo>
+                <a:lnTo>
+                  <a:pt x="2950440" y="2043890"/>
+                </a:lnTo>
+                <a:lnTo>
+                  <a:pt x="2951200" y="2044209"/>
+                </a:lnTo>
+                <a:cubicBezTo>
+                  <a:pt x="2966732" y="2053275"/>
+                  <a:pt x="2979910" y="2066404"/>
+                  <a:pt x="2989324" y="2082660"/>
+                </a:cubicBezTo>
+                <a:cubicBezTo>
+                  <a:pt x="2989324" y="2082660"/>
+                  <a:pt x="2989324" y="2082660"/>
+                  <a:pt x="3279247" y="2584089"/>
+                </a:cubicBezTo>
+                <a:cubicBezTo>
+                  <a:pt x="3298074" y="2615350"/>
+                  <a:pt x="3298074" y="2655364"/>
+                  <a:pt x="3279247" y="2686626"/>
+                </a:cubicBezTo>
+                <a:cubicBezTo>
+                  <a:pt x="3279247" y="2686626"/>
+                  <a:pt x="3279247" y="2686626"/>
+                  <a:pt x="2989324" y="3188054"/>
+                </a:cubicBezTo>
+                <a:cubicBezTo>
+                  <a:pt x="2970497" y="3220565"/>
+                  <a:pt x="2936610" y="3240573"/>
+                  <a:pt x="2898957" y="3240573"/>
+                </a:cubicBezTo>
+                <a:cubicBezTo>
+                  <a:pt x="2898957" y="3240573"/>
+                  <a:pt x="2898957" y="3240573"/>
+                  <a:pt x="2317855" y="3240573"/>
+                </a:cubicBezTo>
+                <a:cubicBezTo>
+                  <a:pt x="2281457" y="3240573"/>
+                  <a:pt x="2246316" y="3220565"/>
+                  <a:pt x="2228744" y="3188054"/>
+                </a:cubicBezTo>
+                <a:cubicBezTo>
+                  <a:pt x="2228744" y="3188054"/>
+                  <a:pt x="2228744" y="3188054"/>
+                  <a:pt x="2072563" y="2919100"/>
+                </a:cubicBezTo>
+                <a:lnTo>
+                  <a:pt x="2054920" y="2888716"/>
+                </a:lnTo>
+                <a:lnTo>
+                  <a:pt x="2068802" y="2888716"/>
+                </a:lnTo>
+                <a:lnTo>
+                  <a:pt x="2134418" y="2888716"/>
+                </a:lnTo>
+                <a:lnTo>
+                  <a:pt x="2162922" y="2937803"/>
+                </a:lnTo>
+                <a:cubicBezTo>
+                  <a:pt x="2271824" y="3125340"/>
+                  <a:pt x="2271824" y="3125340"/>
+                  <a:pt x="2271824" y="3125340"/>
+                </a:cubicBezTo>
+                <a:cubicBezTo>
+                  <a:pt x="2287402" y="3154162"/>
+                  <a:pt x="2318557" y="3171900"/>
+                  <a:pt x="2350824" y="3171900"/>
+                </a:cubicBezTo>
+                <a:cubicBezTo>
+                  <a:pt x="2865989" y="3171900"/>
+                  <a:pt x="2865989" y="3171900"/>
+                  <a:pt x="2865989" y="3171900"/>
+                </a:cubicBezTo>
+                <a:cubicBezTo>
+                  <a:pt x="2899368" y="3171900"/>
+                  <a:pt x="2929410" y="3154162"/>
+                  <a:pt x="2946100" y="3125340"/>
+                </a:cubicBezTo>
+                <a:cubicBezTo>
+                  <a:pt x="3203126" y="2680809"/>
+                  <a:pt x="3203126" y="2680809"/>
+                  <a:pt x="3203126" y="2680809"/>
+                </a:cubicBezTo>
+                <a:cubicBezTo>
+                  <a:pt x="3219816" y="2653094"/>
+                  <a:pt x="3219816" y="2617620"/>
+                  <a:pt x="3203126" y="2589906"/>
+                </a:cubicBezTo>
+                <a:cubicBezTo>
+                  <a:pt x="2946100" y="2145375"/>
+                  <a:pt x="2946100" y="2145375"/>
+                  <a:pt x="2946100" y="2145375"/>
+                </a:cubicBezTo>
+                <a:cubicBezTo>
+                  <a:pt x="2937755" y="2130963"/>
+                  <a:pt x="2926072" y="2119323"/>
+                  <a:pt x="2912303" y="2111287"/>
+                </a:cubicBezTo>
+                <a:lnTo>
+                  <a:pt x="2908392" y="2109648"/>
+                </a:lnTo>
+                <a:lnTo>
+                  <a:pt x="2929357" y="2073390"/>
+                </a:lnTo>
+                <a:lnTo>
+                  <a:pt x="2944948" y="2046424"/>
+                </a:lnTo>
+                <a:lnTo>
+                  <a:pt x="2928777" y="2039643"/>
+                </a:lnTo>
+                <a:cubicBezTo>
+                  <a:pt x="2920010" y="2037259"/>
+                  <a:pt x="2910833" y="2036009"/>
+                  <a:pt x="2901420" y="2036009"/>
+                </a:cubicBezTo>
+                <a:cubicBezTo>
+                  <a:pt x="2320317" y="2036009"/>
+                  <a:pt x="2320317" y="2036009"/>
+                  <a:pt x="2320317" y="2036009"/>
+                </a:cubicBezTo>
+                <a:cubicBezTo>
+                  <a:pt x="2283920" y="2036009"/>
+                  <a:pt x="2248778" y="2056016"/>
+                  <a:pt x="2231207" y="2088527"/>
+                </a:cubicBezTo>
+                <a:cubicBezTo>
+                  <a:pt x="1940028" y="2589956"/>
+                  <a:pt x="1940028" y="2589956"/>
+                  <a:pt x="1940028" y="2589956"/>
+                </a:cubicBezTo>
+                <a:cubicBezTo>
+                  <a:pt x="1921201" y="2621217"/>
+                  <a:pt x="1921201" y="2661231"/>
+                  <a:pt x="1940028" y="2692493"/>
+                </a:cubicBezTo>
+                <a:cubicBezTo>
+                  <a:pt x="1976425" y="2755171"/>
+                  <a:pt x="2008272" y="2810015"/>
+                  <a:pt x="2036139" y="2858003"/>
+                </a:cubicBezTo>
+                <a:lnTo>
+                  <a:pt x="2050209" y="2882232"/>
+                </a:lnTo>
+                <a:lnTo>
+                  <a:pt x="1985031" y="2882232"/>
+                </a:lnTo>
+                <a:cubicBezTo>
+                  <a:pt x="1782341" y="2882232"/>
+                  <a:pt x="1458037" y="2882232"/>
+                  <a:pt x="939150" y="2882232"/>
+                </a:cubicBezTo>
+                <a:cubicBezTo>
+                  <a:pt x="852483" y="2882232"/>
+                  <a:pt x="768803" y="2834591"/>
+                  <a:pt x="726963" y="2757176"/>
+                </a:cubicBezTo>
+                <a:cubicBezTo>
+                  <a:pt x="726963" y="2757176"/>
+                  <a:pt x="726963" y="2757176"/>
+                  <a:pt x="33622" y="1563194"/>
+                </a:cubicBezTo>
+                <a:cubicBezTo>
+                  <a:pt x="-11207" y="1488756"/>
+                  <a:pt x="-11207" y="1393476"/>
+                  <a:pt x="33622" y="1319038"/>
+                </a:cubicBezTo>
+                <a:cubicBezTo>
+                  <a:pt x="33622" y="1319038"/>
+                  <a:pt x="33622" y="1319038"/>
+                  <a:pt x="726963" y="125055"/>
+                </a:cubicBezTo>
+                <a:cubicBezTo>
+                  <a:pt x="768803" y="47640"/>
+                  <a:pt x="852483" y="0"/>
+                  <a:pt x="939150" y="0"/>
+                </a:cubicBezTo>
+                <a:close/>
+              </a:path>
+            </a:pathLst>
+          </a:custGeom>
+          <a:solidFill>
+            <a:schemeClr val="tx1">
+              <a:lumMod val="50000"/>
+              <a:lumOff val="50000"/>
+              <a:alpha val="15000"/>
+            </a:schemeClr>
+          </a:solidFill>
+          <a:ln>
+            <a:noFill/>
+          </a:ln>
+        </p:spPr>
+        <p:style>
+          <a:lnRef idx="2">
+            <a:schemeClr val="accent1">
+              <a:shade val="50000"/>
+            </a:schemeClr>
+          </a:lnRef>
+          <a:fillRef idx="1">
+            <a:schemeClr val="accent1"/>
+          </a:fillRef>
+          <a:effectRef idx="0">
+            <a:schemeClr val="accent1"/>
+          </a:effectRef>
+          <a:fontRef idx="minor">
+            <a:schemeClr val="lt1"/>
+          </a:fontRef>
+        </p:style>
+        <p:txBody>
+          <a:bodyPr wrap="square" rtlCol="0" anchor="ctr">
+            <a:noAutofit/>
+          </a:bodyPr>
+          <a:lstStyle/>
+          <a:p>
+            <a:pPr algn="ctr"/>
+            <a:endParaRPr lang="en-US" dirty="0"/>
+          </a:p>
+        </p:txBody>
+      </p:sp>
+      <p:sp>
+        <p:nvSpPr>
+          <p:cNvPr id="20" name="Freeform: Shape 19">
+            <a:extLst>
+              <a:ext uri="{FF2B5EF4-FFF2-40B4-BE49-F238E27FC236}">
+                <a16:creationId xmlns:a16="http://schemas.microsoft.com/office/drawing/2014/main" id="{D4340B2E-01FD-4F5D-9C4D-AD3923AD20BA}"/>
+              </a:ext>
+              <a:ext uri="{C183D7F6-B498-43B3-948B-1728B52AA6E4}">
+                <adec:decorative xmlns:adec="http://schemas.microsoft.com/office/drawing/2017/decorative" val="1"/>
+              </a:ext>
+            </a:extLst>
+          </p:cNvPr>
+          <p:cNvSpPr>
+            <a:spLocks noGrp="1" noRot="1" noChangeAspect="1" noMove="1" noResize="1" noEditPoints="1" noAdjustHandles="1" noChangeArrowheads="1" noChangeShapeType="1" noTextEdit="1"/>
+          </p:cNvSpPr>
+          <p:nvPr>
+            <p:extLst>
+              <p:ext uri="{386F3935-93C4-4BCD-93E2-E3B085C9AB24}">
+                <p16:designElem xmlns:p16="http://schemas.microsoft.com/office/powerpoint/2015/main" val="1"/>
+              </p:ext>
+            </p:extLst>
+          </p:nvPr>
+        </p:nvSpPr>
+        <p:spPr>
+          <a:xfrm>
+            <a:off x="8691733" y="843530"/>
+            <a:ext cx="3309879" cy="2983688"/>
+          </a:xfrm>
+          <a:custGeom>
+            <a:avLst/>
+            <a:gdLst>
+              <a:gd name="connsiteX0" fmla="*/ 944317 w 3309879"/>
+              <a:gd name="connsiteY0" fmla="*/ 0 h 2983688"/>
+              <a:gd name="connsiteX1" fmla="*/ 2368743 w 3309879"/>
+              <a:gd name="connsiteY1" fmla="*/ 0 h 2983688"/>
+              <a:gd name="connsiteX2" fmla="*/ 2572231 w 3309879"/>
+              <a:gd name="connsiteY2" fmla="*/ 116416 h 2983688"/>
+              <a:gd name="connsiteX3" fmla="*/ 3284443 w 3309879"/>
+              <a:gd name="connsiteY3" fmla="*/ 1371117 h 2983688"/>
+              <a:gd name="connsiteX4" fmla="*/ 3284443 w 3309879"/>
+              <a:gd name="connsiteY4" fmla="*/ 1612573 h 2983688"/>
+              <a:gd name="connsiteX5" fmla="*/ 2572231 w 3309879"/>
+              <a:gd name="connsiteY5" fmla="*/ 2867272 h 2983688"/>
+              <a:gd name="connsiteX6" fmla="*/ 2368743 w 3309879"/>
+              <a:gd name="connsiteY6" fmla="*/ 2983688 h 2983688"/>
+              <a:gd name="connsiteX7" fmla="*/ 944317 w 3309879"/>
+              <a:gd name="connsiteY7" fmla="*/ 2983688 h 2983688"/>
+              <a:gd name="connsiteX8" fmla="*/ 740830 w 3309879"/>
+              <a:gd name="connsiteY8" fmla="*/ 2867272 h 2983688"/>
+              <a:gd name="connsiteX9" fmla="*/ 28617 w 3309879"/>
+              <a:gd name="connsiteY9" fmla="*/ 1612573 h 2983688"/>
+              <a:gd name="connsiteX10" fmla="*/ 28617 w 3309879"/>
+              <a:gd name="connsiteY10" fmla="*/ 1371117 h 2983688"/>
+              <a:gd name="connsiteX11" fmla="*/ 740830 w 3309879"/>
+              <a:gd name="connsiteY11" fmla="*/ 116416 h 2983688"/>
+              <a:gd name="connsiteX12" fmla="*/ 944317 w 3309879"/>
+              <a:gd name="connsiteY12" fmla="*/ 0 h 2983688"/>
+            </a:gdLst>
+            <a:ahLst/>
+            <a:cxnLst>
+              <a:cxn ang="0">
+                <a:pos x="connsiteX0" y="connsiteY0"/>
+              </a:cxn>
+              <a:cxn ang="0">
+                <a:pos x="connsiteX1" y="connsiteY1"/>
+              </a:cxn>
+              <a:cxn ang="0">
+                <a:pos x="connsiteX2" y="connsiteY2"/>
+              </a:cxn>
+              <a:cxn ang="0">
+                <a:pos x="connsiteX3" y="connsiteY3"/>
+              </a:cxn>
+              <a:cxn ang="0">
+                <a:pos x="connsiteX4" y="connsiteY4"/>
+              </a:cxn>
+              <a:cxn ang="0">
+                <a:pos x="connsiteX5" y="connsiteY5"/>
+              </a:cxn>
+              <a:cxn ang="0">
+                <a:pos x="connsiteX6" y="connsiteY6"/>
+              </a:cxn>
+              <a:cxn ang="0">
+                <a:pos x="connsiteX7" y="connsiteY7"/>
+              </a:cxn>
+              <a:cxn ang="0">
+                <a:pos x="connsiteX8" y="connsiteY8"/>
+              </a:cxn>
+              <a:cxn ang="0">
+                <a:pos x="connsiteX9" y="connsiteY9"/>
+              </a:cxn>
+              <a:cxn ang="0">
+                <a:pos x="connsiteX10" y="connsiteY10"/>
+              </a:cxn>
+              <a:cxn ang="0">
+                <a:pos x="connsiteX11" y="connsiteY11"/>
+              </a:cxn>
+              <a:cxn ang="0">
+                <a:pos x="connsiteX12" y="connsiteY12"/>
+              </a:cxn>
+            </a:cxnLst>
+            <a:rect l="l" t="t" r="r" b="b"/>
+            <a:pathLst>
+              <a:path w="3309879" h="2983688">
+                <a:moveTo>
+                  <a:pt x="944317" y="0"/>
+                </a:moveTo>
+                <a:cubicBezTo>
+                  <a:pt x="2368743" y="0"/>
+                  <a:pt x="2368743" y="0"/>
+                  <a:pt x="2368743" y="0"/>
+                </a:cubicBezTo>
+                <a:cubicBezTo>
+                  <a:pt x="2440811" y="0"/>
+                  <a:pt x="2534078" y="51740"/>
+                  <a:pt x="2572231" y="116416"/>
+                </a:cubicBezTo>
+                <a:cubicBezTo>
+                  <a:pt x="3284443" y="1371117"/>
+                  <a:pt x="3284443" y="1371117"/>
+                  <a:pt x="3284443" y="1371117"/>
+                </a:cubicBezTo>
+                <a:cubicBezTo>
+                  <a:pt x="3318358" y="1440104"/>
+                  <a:pt x="3318358" y="1543584"/>
+                  <a:pt x="3284443" y="1612573"/>
+                </a:cubicBezTo>
+                <a:cubicBezTo>
+                  <a:pt x="2572231" y="2867272"/>
+                  <a:pt x="2572231" y="2867272"/>
+                  <a:pt x="2572231" y="2867272"/>
+                </a:cubicBezTo>
+                <a:cubicBezTo>
+                  <a:pt x="2534078" y="2931949"/>
+                  <a:pt x="2440811" y="2983688"/>
+                  <a:pt x="2368743" y="2983688"/>
+                </a:cubicBezTo>
+                <a:lnTo>
+                  <a:pt x="944317" y="2983688"/>
+                </a:lnTo>
+                <a:cubicBezTo>
+                  <a:pt x="868010" y="2983688"/>
+                  <a:pt x="774745" y="2931949"/>
+                  <a:pt x="740830" y="2867272"/>
+                </a:cubicBezTo>
+                <a:cubicBezTo>
+                  <a:pt x="28617" y="1612573"/>
+                  <a:pt x="28617" y="1612573"/>
+                  <a:pt x="28617" y="1612573"/>
+                </a:cubicBezTo>
+                <a:cubicBezTo>
+                  <a:pt x="-9538" y="1543584"/>
+                  <a:pt x="-9538" y="1440104"/>
+                  <a:pt x="28617" y="1371117"/>
+                </a:cubicBezTo>
+                <a:cubicBezTo>
+                  <a:pt x="740830" y="116416"/>
+                  <a:pt x="740830" y="116416"/>
+                  <a:pt x="740830" y="116416"/>
+                </a:cubicBezTo>
+                <a:cubicBezTo>
+                  <a:pt x="774745" y="51740"/>
+                  <a:pt x="868010" y="0"/>
+                  <a:pt x="944317" y="0"/>
+                </a:cubicBezTo>
+                <a:close/>
+              </a:path>
+            </a:pathLst>
+          </a:custGeom>
+          <a:solidFill>
+            <a:schemeClr val="tx1">
+              <a:lumMod val="50000"/>
+              <a:lumOff val="50000"/>
+              <a:alpha val="15000"/>
+            </a:schemeClr>
+          </a:solidFill>
+          <a:ln>
+            <a:noFill/>
+          </a:ln>
+        </p:spPr>
+        <p:style>
+          <a:lnRef idx="2">
+            <a:schemeClr val="accent1">
+              <a:shade val="50000"/>
+            </a:schemeClr>
+          </a:lnRef>
+          <a:fillRef idx="1">
+            <a:schemeClr val="accent1"/>
+          </a:fillRef>
+          <a:effectRef idx="0">
+            <a:schemeClr val="accent1"/>
+          </a:effectRef>
+          <a:fontRef idx="minor">
+            <a:schemeClr val="lt1"/>
+          </a:fontRef>
+        </p:style>
+        <p:txBody>
+          <a:bodyPr wrap="square" rtlCol="0" anchor="ctr">
+            <a:noAutofit/>
+          </a:bodyPr>
+          <a:lstStyle/>
+          <a:p>
+            <a:pPr algn="ctr"/>
+            <a:endParaRPr lang="en-US" dirty="0"/>
+          </a:p>
+        </p:txBody>
+      </p:sp>
+      <p:pic>
+        <p:nvPicPr>
+          <p:cNvPr id="7" name="Graphic 6" descr="Table outline">
+            <a:extLst>
+              <a:ext uri="{FF2B5EF4-FFF2-40B4-BE49-F238E27FC236}">
+                <a16:creationId xmlns:a16="http://schemas.microsoft.com/office/drawing/2014/main" id="{0F832088-B2E2-A048-B5F5-794E1D20213C}"/>
+              </a:ext>
+            </a:extLst>
+          </p:cNvPr>
+          <p:cNvPicPr>
+            <a:picLocks noChangeAspect="1"/>
+          </p:cNvPicPr>
+          <p:nvPr/>
+        </p:nvPicPr>
+        <p:blipFill>
+          <a:blip r:embed="rId4">
+            <a:extLst>
+              <a:ext uri="{28A0092B-C50C-407E-A947-70E740481C1C}">
+                <a14:useLocalDpi xmlns:a14="http://schemas.microsoft.com/office/drawing/2010/main" val="0"/>
+              </a:ext>
+              <a:ext uri="{96DAC541-7B7A-43D3-8B79-37D633B846F1}">
+                <asvg:svgBlip xmlns:asvg="http://schemas.microsoft.com/office/drawing/2016/SVG/main" r:embed="rId5"/>
+              </a:ext>
+            </a:extLst>
+          </a:blip>
+          <a:stretch>
+            <a:fillRect/>
+          </a:stretch>
+        </p:blipFill>
+        <p:spPr>
+          <a:xfrm>
+            <a:off x="6255567" y="3063687"/>
+            <a:ext cx="2433099" cy="2433099"/>
+          </a:xfrm>
+          <a:prstGeom prst="rect">
+            <a:avLst/>
+          </a:prstGeom>
+        </p:spPr>
+      </p:pic>
+      <p:pic>
+        <p:nvPicPr>
+          <p:cNvPr id="5" name="Graphic 4" descr="Images outline">
+            <a:extLst>
+              <a:ext uri="{FF2B5EF4-FFF2-40B4-BE49-F238E27FC236}">
+                <a16:creationId xmlns:a16="http://schemas.microsoft.com/office/drawing/2014/main" id="{BCA8257A-8846-4546-A55F-E95BF41A0658}"/>
+              </a:ext>
+            </a:extLst>
+          </p:cNvPr>
+          <p:cNvPicPr>
+            <a:picLocks noChangeAspect="1"/>
+          </p:cNvPicPr>
+          <p:nvPr/>
+        </p:nvPicPr>
+        <p:blipFill>
+          <a:blip r:embed="rId6">
+            <a:extLst>
+              <a:ext uri="{28A0092B-C50C-407E-A947-70E740481C1C}">
+                <a14:useLocalDpi xmlns:a14="http://schemas.microsoft.com/office/drawing/2010/main" val="0"/>
+              </a:ext>
+              <a:ext uri="{96DAC541-7B7A-43D3-8B79-37D633B846F1}">
+                <asvg:svgBlip xmlns:asvg="http://schemas.microsoft.com/office/drawing/2016/SVG/main" r:embed="rId7"/>
+              </a:ext>
+            </a:extLst>
+          </a:blip>
+          <a:stretch>
+            <a:fillRect/>
+          </a:stretch>
+        </p:blipFill>
+        <p:spPr>
+          <a:xfrm>
+            <a:off x="9279130" y="1267832"/>
+            <a:ext cx="2135083" cy="2135083"/>
+          </a:xfrm>
+          <a:prstGeom prst="rect">
+            <a:avLst/>
+          </a:prstGeom>
+        </p:spPr>
+      </p:pic>
+    </p:spTree>
+    <p:extLst>
+      <p:ext uri="{BB962C8B-B14F-4D97-AF65-F5344CB8AC3E}">
+        <p14:creationId xmlns:p14="http://schemas.microsoft.com/office/powerpoint/2010/main" val="517217346"/>
+      </p:ext>
+    </p:extLst>
+  </p:cSld>
+  <p:clrMapOvr>
+    <a:masterClrMapping/>
+  </p:clrMapOvr>
+</p:sld>
+</file>
+
+<file path=ppt/slides/slide20.xml><?xml version="1.0" encoding="utf-8"?>
+<p:sld xmlns:a="http://schemas.openxmlformats.org/drawingml/2006/main" xmlns:r="http://schemas.openxmlformats.org/officeDocument/2006/relationships" xmlns:p="http://schemas.openxmlformats.org/presentationml/2006/main">
+  <p:cSld>
+    <p:bg>
+      <p:bgPr>
+        <a:solidFill>
+          <a:schemeClr val="bg1"/>
+        </a:solidFill>
+        <a:effectLst/>
+      </p:bgPr>
+    </p:bg>
+    <p:spTree>
+      <p:nvGrpSpPr>
+        <p:cNvPr id="1" name=""/>
+        <p:cNvGrpSpPr/>
+        <p:nvPr/>
+      </p:nvGrpSpPr>
+      <p:grpSpPr>
+        <a:xfrm>
+          <a:off x="0" y="0"/>
+          <a:ext cx="0" cy="0"/>
+          <a:chOff x="0" y="0"/>
+          <a:chExt cx="0" cy="0"/>
+        </a:xfrm>
+      </p:grpSpPr>
+      <p:sp useBgFill="1">
+        <p:nvSpPr>
+          <p:cNvPr id="10" name="Rectangle 9">
+            <a:extLst>
+              <a:ext uri="{FF2B5EF4-FFF2-40B4-BE49-F238E27FC236}">
+                <a16:creationId xmlns:a16="http://schemas.microsoft.com/office/drawing/2014/main" id="{91F32EBA-ED97-466E-8CFA-8382584155D0}"/>
+              </a:ext>
+              <a:ext uri="{C183D7F6-B498-43B3-948B-1728B52AA6E4}">
+                <adec:decorative xmlns:adec="http://schemas.microsoft.com/office/drawing/2017/decorative" val="1"/>
+              </a:ext>
+            </a:extLst>
+          </p:cNvPr>
+          <p:cNvSpPr>
+            <a:spLocks noGrp="1" noRot="1" noChangeAspect="1" noMove="1" noResize="1" noEditPoints="1" noAdjustHandles="1" noChangeArrowheads="1" noChangeShapeType="1" noTextEdit="1"/>
+          </p:cNvSpPr>
+          <p:nvPr>
+            <p:extLst>
+              <p:ext uri="{386F3935-93C4-4BCD-93E2-E3B085C9AB24}">
+                <p16:designElem xmlns:p16="http://schemas.microsoft.com/office/powerpoint/2015/main" val="1"/>
+              </p:ext>
+            </p:extLst>
+          </p:nvPr>
+        </p:nvSpPr>
+        <p:spPr>
+          <a:xfrm>
+            <a:off x="0" y="0"/>
+            <a:ext cx="12192000" cy="6858000"/>
+          </a:xfrm>
+          <a:prstGeom prst="rect">
+            <a:avLst/>
+          </a:prstGeom>
+          <a:ln>
+            <a:noFill/>
+          </a:ln>
+        </p:spPr>
+        <p:style>
+          <a:lnRef idx="2">
+            <a:schemeClr val="accent1">
+              <a:shade val="50000"/>
+            </a:schemeClr>
+          </a:lnRef>
+          <a:fillRef idx="1">
+            <a:schemeClr val="accent1"/>
+          </a:fillRef>
+          <a:effectRef idx="0">
+            <a:schemeClr val="accent1"/>
+          </a:effectRef>
+          <a:fontRef idx="minor">
+            <a:schemeClr val="lt1"/>
+          </a:fontRef>
+        </p:style>
+        <p:txBody>
+          <a:bodyPr rtlCol="0" anchor="ctr"/>
+          <a:lstStyle/>
+          <a:p>
+            <a:pPr algn="ctr"/>
             <a:endParaRPr lang="en-US"/>
           </a:p>
         </p:txBody>
@@ -5545,8 +7057,8 @@
               <a:buNone/>
             </a:pPr>
             <a:r>
-              <a:rPr lang="en-GB" sz="2400"/>
-              <a:t>…</a:t>
+              <a:rPr lang="en-GB" sz="2400" dirty="0"/>
+              <a:t>… Exercise 4</a:t>
             </a:r>
           </a:p>
         </p:txBody>
@@ -5559,7 +7071,7 @@
                 <a16:creationId xmlns:a16="http://schemas.microsoft.com/office/drawing/2014/main" id="{62A38935-BB53-4DF7-A56E-48DD25B685D7}"/>
               </a:ext>
               <a:ext uri="{C183D7F6-B498-43B3-948B-1728B52AA6E4}">
-                <adec:decorative xmlns="" xmlns:adec="http://schemas.microsoft.com/office/drawing/2017/decorative" val="1"/>
+                <adec:decorative xmlns:adec="http://schemas.microsoft.com/office/drawing/2017/decorative" val="1"/>
               </a:ext>
             </a:extLst>
           </p:cNvPr>
@@ -6346,7 +7858,7 @@
                 <a14:useLocalDpi xmlns:a14="http://schemas.microsoft.com/office/drawing/2010/main" val="0"/>
               </a:ext>
               <a:ext uri="{96DAC541-7B7A-43D3-8B79-37D633B846F1}">
-                <asvg:svgBlip xmlns="" xmlns:asvg="http://schemas.microsoft.com/office/drawing/2016/SVG/main" r:embed="rId3"/>
+                <asvg:svgBlip xmlns:asvg="http://schemas.microsoft.com/office/drawing/2016/SVG/main" r:embed="rId3"/>
               </a:ext>
             </a:extLst>
           </a:blip>
@@ -6377,1425 +7889,6 @@
 </p:sld>
 </file>
 
-<file path=ppt/slides/slide2.xml><?xml version="1.0" encoding="utf-8"?>
-<p:sld xmlns:a="http://schemas.openxmlformats.org/drawingml/2006/main" xmlns:r="http://schemas.openxmlformats.org/officeDocument/2006/relationships" xmlns:p="http://schemas.openxmlformats.org/presentationml/2006/main">
-  <p:cSld>
-    <p:bg>
-      <p:bgPr>
-        <a:solidFill>
-          <a:schemeClr val="bg1">
-            <a:alpha val="0"/>
-          </a:schemeClr>
-        </a:solidFill>
-        <a:effectLst/>
-      </p:bgPr>
-    </p:bg>
-    <p:spTree>
-      <p:nvGrpSpPr>
-        <p:cNvPr id="1" name=""/>
-        <p:cNvGrpSpPr/>
-        <p:nvPr/>
-      </p:nvGrpSpPr>
-      <p:grpSpPr>
-        <a:xfrm>
-          <a:off x="0" y="0"/>
-          <a:ext cx="0" cy="0"/>
-          <a:chOff x="0" y="0"/>
-          <a:chExt cx="0" cy="0"/>
-        </a:xfrm>
-      </p:grpSpPr>
-      <p:sp useBgFill="1">
-        <p:nvSpPr>
-          <p:cNvPr id="14" name="Rectangle 13">
-            <a:extLst>
-              <a:ext uri="{FF2B5EF4-FFF2-40B4-BE49-F238E27FC236}">
-                <a16:creationId xmlns:a16="http://schemas.microsoft.com/office/drawing/2014/main" id="{C4E4288A-DFC8-40A2-90E5-70E851A933AD}"/>
-              </a:ext>
-              <a:ext uri="{C183D7F6-B498-43B3-948B-1728B52AA6E4}">
-                <adec:decorative xmlns="" xmlns:adec="http://schemas.microsoft.com/office/drawing/2017/decorative" val="1"/>
-              </a:ext>
-            </a:extLst>
-          </p:cNvPr>
-          <p:cNvSpPr>
-            <a:spLocks noGrp="1" noRot="1" noChangeAspect="1" noMove="1" noResize="1" noEditPoints="1" noAdjustHandles="1" noChangeArrowheads="1" noChangeShapeType="1" noTextEdit="1"/>
-          </p:cNvSpPr>
-          <p:nvPr>
-            <p:extLst>
-              <p:ext uri="{386F3935-93C4-4BCD-93E2-E3B085C9AB24}">
-                <p16:designElem xmlns:p16="http://schemas.microsoft.com/office/powerpoint/2015/main" val="1"/>
-              </p:ext>
-            </p:extLst>
-          </p:nvPr>
-        </p:nvSpPr>
-        <p:spPr>
-          <a:xfrm>
-            <a:off x="0" y="0"/>
-            <a:ext cx="12192000" cy="6858000"/>
-          </a:xfrm>
-          <a:prstGeom prst="rect">
-            <a:avLst/>
-          </a:prstGeom>
-          <a:ln>
-            <a:noFill/>
-          </a:ln>
-        </p:spPr>
-        <p:style>
-          <a:lnRef idx="2">
-            <a:schemeClr val="accent1">
-              <a:shade val="50000"/>
-            </a:schemeClr>
-          </a:lnRef>
-          <a:fillRef idx="1">
-            <a:schemeClr val="accent1"/>
-          </a:fillRef>
-          <a:effectRef idx="0">
-            <a:schemeClr val="accent1"/>
-          </a:effectRef>
-          <a:fontRef idx="minor">
-            <a:schemeClr val="lt1"/>
-          </a:fontRef>
-        </p:style>
-        <p:txBody>
-          <a:bodyPr rtlCol="0" anchor="ctr"/>
-          <a:lstStyle/>
-          <a:p>
-            <a:pPr algn="ctr"/>
-            <a:endParaRPr lang="en-US" dirty="0"/>
-          </a:p>
-        </p:txBody>
-      </p:sp>
-      <p:sp>
-        <p:nvSpPr>
-          <p:cNvPr id="2" name="Title 1">
-            <a:extLst>
-              <a:ext uri="{FF2B5EF4-FFF2-40B4-BE49-F238E27FC236}">
-                <a16:creationId xmlns:a16="http://schemas.microsoft.com/office/drawing/2014/main" id="{0CA4E17D-5A2A-49B6-8206-1BAA73046333}"/>
-              </a:ext>
-            </a:extLst>
-          </p:cNvPr>
-          <p:cNvSpPr>
-            <a:spLocks noGrp="1"/>
-          </p:cNvSpPr>
-          <p:nvPr>
-            <p:ph type="title"/>
-          </p:nvPr>
-        </p:nvSpPr>
-        <p:spPr>
-          <a:xfrm>
-            <a:off x="991694" y="435547"/>
-            <a:ext cx="5613822" cy="832285"/>
-          </a:xfrm>
-        </p:spPr>
-        <p:txBody>
-          <a:bodyPr anchor="b">
-            <a:normAutofit/>
-          </a:bodyPr>
-          <a:lstStyle/>
-          <a:p>
-            <a:r>
-              <a:rPr lang="en-GB" sz="4000" dirty="0"/>
-              <a:t>What is data</a:t>
-            </a:r>
-          </a:p>
-        </p:txBody>
-      </p:sp>
-      <p:sp>
-        <p:nvSpPr>
-          <p:cNvPr id="16" name="Freeform: Shape 15">
-            <a:extLst>
-              <a:ext uri="{FF2B5EF4-FFF2-40B4-BE49-F238E27FC236}">
-                <a16:creationId xmlns:a16="http://schemas.microsoft.com/office/drawing/2014/main" id="{A94A2FC9-6D19-473C-B868-99FDB2044AA9}"/>
-              </a:ext>
-              <a:ext uri="{C183D7F6-B498-43B3-948B-1728B52AA6E4}">
-                <adec:decorative xmlns="" xmlns:adec="http://schemas.microsoft.com/office/drawing/2017/decorative" val="1"/>
-              </a:ext>
-            </a:extLst>
-          </p:cNvPr>
-          <p:cNvSpPr>
-            <a:spLocks noGrp="1" noRot="1" noChangeAspect="1" noMove="1" noResize="1" noEditPoints="1" noAdjustHandles="1" noChangeArrowheads="1" noChangeShapeType="1" noTextEdit="1"/>
-          </p:cNvSpPr>
-          <p:nvPr>
-            <p:extLst>
-              <p:ext uri="{386F3935-93C4-4BCD-93E2-E3B085C9AB24}">
-                <p16:designElem xmlns:p16="http://schemas.microsoft.com/office/powerpoint/2015/main" val="1"/>
-              </p:ext>
-            </p:extLst>
-          </p:nvPr>
-        </p:nvSpPr>
-        <p:spPr>
-          <a:xfrm>
-            <a:off x="7036077" y="435547"/>
-            <a:ext cx="1969483" cy="1775389"/>
-          </a:xfrm>
-          <a:custGeom>
-            <a:avLst/>
-            <a:gdLst>
-              <a:gd name="connsiteX0" fmla="*/ 530616 w 1859834"/>
-              <a:gd name="connsiteY0" fmla="*/ 0 h 1676546"/>
-              <a:gd name="connsiteX1" fmla="*/ 1331006 w 1859834"/>
-              <a:gd name="connsiteY1" fmla="*/ 0 h 1676546"/>
-              <a:gd name="connsiteX2" fmla="*/ 1445347 w 1859834"/>
-              <a:gd name="connsiteY2" fmla="*/ 65415 h 1676546"/>
-              <a:gd name="connsiteX3" fmla="*/ 1845541 w 1859834"/>
-              <a:gd name="connsiteY3" fmla="*/ 770436 h 1676546"/>
-              <a:gd name="connsiteX4" fmla="*/ 1845541 w 1859834"/>
-              <a:gd name="connsiteY4" fmla="*/ 906111 h 1676546"/>
-              <a:gd name="connsiteX5" fmla="*/ 1445347 w 1859834"/>
-              <a:gd name="connsiteY5" fmla="*/ 1611131 h 1676546"/>
-              <a:gd name="connsiteX6" fmla="*/ 1331006 w 1859834"/>
-              <a:gd name="connsiteY6" fmla="*/ 1676546 h 1676546"/>
-              <a:gd name="connsiteX7" fmla="*/ 530616 w 1859834"/>
-              <a:gd name="connsiteY7" fmla="*/ 1676546 h 1676546"/>
-              <a:gd name="connsiteX8" fmla="*/ 416275 w 1859834"/>
-              <a:gd name="connsiteY8" fmla="*/ 1611131 h 1676546"/>
-              <a:gd name="connsiteX9" fmla="*/ 16080 w 1859834"/>
-              <a:gd name="connsiteY9" fmla="*/ 906111 h 1676546"/>
-              <a:gd name="connsiteX10" fmla="*/ 16080 w 1859834"/>
-              <a:gd name="connsiteY10" fmla="*/ 770436 h 1676546"/>
-              <a:gd name="connsiteX11" fmla="*/ 416275 w 1859834"/>
-              <a:gd name="connsiteY11" fmla="*/ 65415 h 1676546"/>
-              <a:gd name="connsiteX12" fmla="*/ 530616 w 1859834"/>
-              <a:gd name="connsiteY12" fmla="*/ 0 h 1676546"/>
-            </a:gdLst>
-            <a:ahLst/>
-            <a:cxnLst>
-              <a:cxn ang="0">
-                <a:pos x="connsiteX0" y="connsiteY0"/>
-              </a:cxn>
-              <a:cxn ang="0">
-                <a:pos x="connsiteX1" y="connsiteY1"/>
-              </a:cxn>
-              <a:cxn ang="0">
-                <a:pos x="connsiteX2" y="connsiteY2"/>
-              </a:cxn>
-              <a:cxn ang="0">
-                <a:pos x="connsiteX3" y="connsiteY3"/>
-              </a:cxn>
-              <a:cxn ang="0">
-                <a:pos x="connsiteX4" y="connsiteY4"/>
-              </a:cxn>
-              <a:cxn ang="0">
-                <a:pos x="connsiteX5" y="connsiteY5"/>
-              </a:cxn>
-              <a:cxn ang="0">
-                <a:pos x="connsiteX6" y="connsiteY6"/>
-              </a:cxn>
-              <a:cxn ang="0">
-                <a:pos x="connsiteX7" y="connsiteY7"/>
-              </a:cxn>
-              <a:cxn ang="0">
-                <a:pos x="connsiteX8" y="connsiteY8"/>
-              </a:cxn>
-              <a:cxn ang="0">
-                <a:pos x="connsiteX9" y="connsiteY9"/>
-              </a:cxn>
-              <a:cxn ang="0">
-                <a:pos x="connsiteX10" y="connsiteY10"/>
-              </a:cxn>
-              <a:cxn ang="0">
-                <a:pos x="connsiteX11" y="connsiteY11"/>
-              </a:cxn>
-              <a:cxn ang="0">
-                <a:pos x="connsiteX12" y="connsiteY12"/>
-              </a:cxn>
-            </a:cxnLst>
-            <a:rect l="l" t="t" r="r" b="b"/>
-            <a:pathLst>
-              <a:path w="1859834" h="1676546">
-                <a:moveTo>
-                  <a:pt x="530616" y="0"/>
-                </a:moveTo>
-                <a:cubicBezTo>
-                  <a:pt x="1331006" y="0"/>
-                  <a:pt x="1331006" y="0"/>
-                  <a:pt x="1331006" y="0"/>
-                </a:cubicBezTo>
-                <a:cubicBezTo>
-                  <a:pt x="1371502" y="0"/>
-                  <a:pt x="1423909" y="29073"/>
-                  <a:pt x="1445347" y="65415"/>
-                </a:cubicBezTo>
-                <a:cubicBezTo>
-                  <a:pt x="1845541" y="770436"/>
-                  <a:pt x="1845541" y="770436"/>
-                  <a:pt x="1845541" y="770436"/>
-                </a:cubicBezTo>
-                <a:cubicBezTo>
-                  <a:pt x="1864599" y="809200"/>
-                  <a:pt x="1864599" y="867346"/>
-                  <a:pt x="1845541" y="906111"/>
-                </a:cubicBezTo>
-                <a:cubicBezTo>
-                  <a:pt x="1445347" y="1611131"/>
-                  <a:pt x="1445347" y="1611131"/>
-                  <a:pt x="1445347" y="1611131"/>
-                </a:cubicBezTo>
-                <a:cubicBezTo>
-                  <a:pt x="1423909" y="1647474"/>
-                  <a:pt x="1371502" y="1676546"/>
-                  <a:pt x="1331006" y="1676546"/>
-                </a:cubicBezTo>
-                <a:lnTo>
-                  <a:pt x="530616" y="1676546"/>
-                </a:lnTo>
-                <a:cubicBezTo>
-                  <a:pt x="487738" y="1676546"/>
-                  <a:pt x="435332" y="1647474"/>
-                  <a:pt x="416275" y="1611131"/>
-                </a:cubicBezTo>
-                <a:cubicBezTo>
-                  <a:pt x="16080" y="906111"/>
-                  <a:pt x="16080" y="906111"/>
-                  <a:pt x="16080" y="906111"/>
-                </a:cubicBezTo>
-                <a:cubicBezTo>
-                  <a:pt x="-5359" y="867346"/>
-                  <a:pt x="-5359" y="809200"/>
-                  <a:pt x="16080" y="770436"/>
-                </a:cubicBezTo>
-                <a:cubicBezTo>
-                  <a:pt x="416275" y="65415"/>
-                  <a:pt x="416275" y="65415"/>
-                  <a:pt x="416275" y="65415"/>
-                </a:cubicBezTo>
-                <a:cubicBezTo>
-                  <a:pt x="435332" y="29073"/>
-                  <a:pt x="487738" y="0"/>
-                  <a:pt x="530616" y="0"/>
-                </a:cubicBezTo>
-                <a:close/>
-              </a:path>
-            </a:pathLst>
-          </a:custGeom>
-          <a:solidFill>
-            <a:schemeClr val="tx1">
-              <a:lumMod val="50000"/>
-              <a:lumOff val="50000"/>
-              <a:alpha val="15000"/>
-            </a:schemeClr>
-          </a:solidFill>
-          <a:ln>
-            <a:noFill/>
-          </a:ln>
-        </p:spPr>
-        <p:style>
-          <a:lnRef idx="2">
-            <a:schemeClr val="accent1">
-              <a:shade val="50000"/>
-            </a:schemeClr>
-          </a:lnRef>
-          <a:fillRef idx="1">
-            <a:schemeClr val="accent1"/>
-          </a:fillRef>
-          <a:effectRef idx="0">
-            <a:schemeClr val="accent1"/>
-          </a:effectRef>
-          <a:fontRef idx="minor">
-            <a:schemeClr val="lt1"/>
-          </a:fontRef>
-        </p:style>
-        <p:txBody>
-          <a:bodyPr wrap="square" rtlCol="0" anchor="ctr">
-            <a:noAutofit/>
-          </a:bodyPr>
-          <a:lstStyle/>
-          <a:p>
-            <a:pPr algn="ctr"/>
-            <a:endParaRPr lang="en-US" dirty="0"/>
-          </a:p>
-        </p:txBody>
-      </p:sp>
-      <p:pic>
-        <p:nvPicPr>
-          <p:cNvPr id="9" name="Graphic 8" descr="Cmd Terminal outline">
-            <a:extLst>
-              <a:ext uri="{FF2B5EF4-FFF2-40B4-BE49-F238E27FC236}">
-                <a16:creationId xmlns:a16="http://schemas.microsoft.com/office/drawing/2014/main" id="{717637AA-34EE-CC49-820A-C3D9BE67B952}"/>
-              </a:ext>
-            </a:extLst>
-          </p:cNvPr>
-          <p:cNvPicPr>
-            <a:picLocks noChangeAspect="1"/>
-          </p:cNvPicPr>
-          <p:nvPr/>
-        </p:nvPicPr>
-        <p:blipFill>
-          <a:blip r:embed="rId2" cstate="hqprint">
-            <a:extLst>
-              <a:ext uri="{28A0092B-C50C-407E-A947-70E740481C1C}">
-                <a14:useLocalDpi xmlns:a14="http://schemas.microsoft.com/office/drawing/2010/main" val="0"/>
-              </a:ext>
-              <a:ext uri="{96DAC541-7B7A-43D3-8B79-37D633B846F1}">
-                <asvg:svgBlip xmlns="" xmlns:asvg="http://schemas.microsoft.com/office/drawing/2016/SVG/main" r:embed="rId3"/>
-              </a:ext>
-            </a:extLst>
-          </a:blip>
-          <a:stretch>
-            <a:fillRect/>
-          </a:stretch>
-        </p:blipFill>
-        <p:spPr>
-          <a:xfrm>
-            <a:off x="7542532" y="843530"/>
-            <a:ext cx="956572" cy="956572"/>
-          </a:xfrm>
-          <a:prstGeom prst="rect">
-            <a:avLst/>
-          </a:prstGeom>
-        </p:spPr>
-      </p:pic>
-      <p:sp>
-        <p:nvSpPr>
-          <p:cNvPr id="3" name="Content Placeholder 2">
-            <a:extLst>
-              <a:ext uri="{FF2B5EF4-FFF2-40B4-BE49-F238E27FC236}">
-                <a16:creationId xmlns:a16="http://schemas.microsoft.com/office/drawing/2014/main" id="{81C9C253-9151-4F30-875B-B69CD1772575}"/>
-              </a:ext>
-            </a:extLst>
-          </p:cNvPr>
-          <p:cNvSpPr>
-            <a:spLocks noGrp="1"/>
-          </p:cNvSpPr>
-          <p:nvPr>
-            <p:ph idx="1"/>
-          </p:nvPr>
-        </p:nvSpPr>
-        <p:spPr>
-          <a:xfrm>
-            <a:off x="991693" y="1267832"/>
-            <a:ext cx="5258180" cy="4584961"/>
-          </a:xfrm>
-        </p:spPr>
-        <p:txBody>
-          <a:bodyPr anchor="t">
-            <a:normAutofit fontScale="85000" lnSpcReduction="20000"/>
-          </a:bodyPr>
-          <a:lstStyle/>
-          <a:p>
-            <a:pPr marL="0" indent="0">
-              <a:lnSpc>
-                <a:spcPct val="120000"/>
-              </a:lnSpc>
-              <a:buNone/>
-            </a:pPr>
-            <a:r>
-              <a:rPr lang="en-GB" sz="2400" dirty="0"/>
-              <a:t>Data does not only mean Excel files with recorded measurements from a machine. </a:t>
-            </a:r>
-          </a:p>
-          <a:p>
-            <a:pPr marL="0" indent="0">
-              <a:lnSpc>
-                <a:spcPct val="120000"/>
-              </a:lnSpc>
-              <a:buNone/>
-            </a:pPr>
-            <a:r>
-              <a:rPr lang="en-GB" sz="3000" b="1" dirty="0"/>
-              <a:t>Data also includes:</a:t>
-            </a:r>
-          </a:p>
-          <a:p>
-            <a:pPr>
-              <a:lnSpc>
-                <a:spcPct val="120000"/>
-              </a:lnSpc>
-            </a:pPr>
-            <a:r>
-              <a:rPr lang="en-GB" sz="2400" dirty="0"/>
-              <a:t>images, not only from microscopes</a:t>
-            </a:r>
-          </a:p>
-          <a:p>
-            <a:pPr>
-              <a:lnSpc>
-                <a:spcPct val="120000"/>
-              </a:lnSpc>
-            </a:pPr>
-            <a:r>
-              <a:rPr lang="en-GB" sz="2400" dirty="0"/>
-              <a:t>information about biological materials, like strain or patient details</a:t>
-            </a:r>
-          </a:p>
-          <a:p>
-            <a:pPr>
-              <a:lnSpc>
-                <a:spcPct val="120000"/>
-              </a:lnSpc>
-            </a:pPr>
-            <a:r>
-              <a:rPr lang="en-GB" sz="2400" dirty="0"/>
-              <a:t>recipes, laboratory and measurement protocols</a:t>
-            </a:r>
-            <a:endParaRPr lang="pl-PL" sz="2400" dirty="0"/>
-          </a:p>
-          <a:p>
-            <a:pPr>
-              <a:lnSpc>
-                <a:spcPct val="120000"/>
-              </a:lnSpc>
-            </a:pPr>
-            <a:r>
-              <a:rPr lang="pl-PL" sz="2400" dirty="0" smtClean="0"/>
-              <a:t>models</a:t>
-            </a:r>
-            <a:endParaRPr lang="en-GB" sz="2400" dirty="0"/>
-          </a:p>
-          <a:p>
-            <a:pPr>
-              <a:lnSpc>
-                <a:spcPct val="120000"/>
-              </a:lnSpc>
-            </a:pPr>
-            <a:r>
-              <a:rPr lang="en-GB" sz="2400" dirty="0"/>
-              <a:t>scripts, analysis procedures, and custom software are also considered data</a:t>
-            </a:r>
-          </a:p>
-        </p:txBody>
-      </p:sp>
-      <p:sp>
-        <p:nvSpPr>
-          <p:cNvPr id="18" name="Freeform: Shape 17">
-            <a:extLst>
-              <a:ext uri="{FF2B5EF4-FFF2-40B4-BE49-F238E27FC236}">
-                <a16:creationId xmlns:a16="http://schemas.microsoft.com/office/drawing/2014/main" id="{8BED0409-854E-49C4-876E-A78C6D881BC8}"/>
-              </a:ext>
-              <a:ext uri="{C183D7F6-B498-43B3-948B-1728B52AA6E4}">
-                <adec:decorative xmlns="" xmlns:adec="http://schemas.microsoft.com/office/drawing/2017/decorative" val="1"/>
-              </a:ext>
-            </a:extLst>
-          </p:cNvPr>
-          <p:cNvSpPr>
-            <a:spLocks noGrp="1" noRot="1" noChangeAspect="1" noMove="1" noResize="1" noEditPoints="1" noAdjustHandles="1" noChangeArrowheads="1" noChangeShapeType="1" noTextEdit="1"/>
-          </p:cNvSpPr>
-          <p:nvPr>
-            <p:extLst>
-              <p:ext uri="{386F3935-93C4-4BCD-93E2-E3B085C9AB24}">
-                <p16:designElem xmlns:p16="http://schemas.microsoft.com/office/powerpoint/2015/main" val="1"/>
-              </p:ext>
-            </p:extLst>
-          </p:nvPr>
-        </p:nvSpPr>
-        <p:spPr>
-          <a:xfrm>
-            <a:off x="5264329" y="2391339"/>
-            <a:ext cx="4295423" cy="4226565"/>
-          </a:xfrm>
-          <a:custGeom>
-            <a:avLst/>
-            <a:gdLst>
-              <a:gd name="connsiteX0" fmla="*/ 2353286 w 3293367"/>
-              <a:gd name="connsiteY0" fmla="*/ 2104683 h 3240573"/>
-              <a:gd name="connsiteX1" fmla="*/ 2868450 w 3293367"/>
-              <a:gd name="connsiteY1" fmla="*/ 2104683 h 3240573"/>
-              <a:gd name="connsiteX2" fmla="*/ 2892703 w 3293367"/>
-              <a:gd name="connsiteY2" fmla="*/ 2107904 h 3240573"/>
-              <a:gd name="connsiteX3" fmla="*/ 2909383 w 3293367"/>
-              <a:gd name="connsiteY3" fmla="*/ 2114898 h 3240573"/>
-              <a:gd name="connsiteX4" fmla="*/ 2899189 w 3293367"/>
-              <a:gd name="connsiteY4" fmla="*/ 2132529 h 3240573"/>
-              <a:gd name="connsiteX5" fmla="*/ 2538022 w 3293367"/>
-              <a:gd name="connsiteY5" fmla="*/ 2757176 h 3240573"/>
-              <a:gd name="connsiteX6" fmla="*/ 2322847 w 3293367"/>
-              <a:gd name="connsiteY6" fmla="*/ 2882232 h 3240573"/>
-              <a:gd name="connsiteX7" fmla="*/ 2149884 w 3293367"/>
-              <a:gd name="connsiteY7" fmla="*/ 2882232 h 3240573"/>
-              <a:gd name="connsiteX8" fmla="*/ 2129707 w 3293367"/>
-              <a:gd name="connsiteY8" fmla="*/ 2882232 h 3240573"/>
-              <a:gd name="connsiteX9" fmla="*/ 2110453 w 3293367"/>
-              <a:gd name="connsiteY9" fmla="*/ 2849077 h 3240573"/>
-              <a:gd name="connsiteX10" fmla="*/ 2016148 w 3293367"/>
-              <a:gd name="connsiteY10" fmla="*/ 2686675 h 3240573"/>
-              <a:gd name="connsiteX11" fmla="*/ 2016148 w 3293367"/>
-              <a:gd name="connsiteY11" fmla="*/ 2595774 h 3240573"/>
-              <a:gd name="connsiteX12" fmla="*/ 2274287 w 3293367"/>
-              <a:gd name="connsiteY12" fmla="*/ 2151242 h 3240573"/>
-              <a:gd name="connsiteX13" fmla="*/ 2353286 w 3293367"/>
-              <a:gd name="connsiteY13" fmla="*/ 2104683 h 3240573"/>
-              <a:gd name="connsiteX14" fmla="*/ 939150 w 3293367"/>
-              <a:gd name="connsiteY14" fmla="*/ 0 h 3240573"/>
-              <a:gd name="connsiteX15" fmla="*/ 2322847 w 3293367"/>
-              <a:gd name="connsiteY15" fmla="*/ 0 h 3240573"/>
-              <a:gd name="connsiteX16" fmla="*/ 2538022 w 3293367"/>
-              <a:gd name="connsiteY16" fmla="*/ 125055 h 3240573"/>
-              <a:gd name="connsiteX17" fmla="*/ 3228376 w 3293367"/>
-              <a:gd name="connsiteY17" fmla="*/ 1319038 h 3240573"/>
-              <a:gd name="connsiteX18" fmla="*/ 3228376 w 3293367"/>
-              <a:gd name="connsiteY18" fmla="*/ 1563194 h 3240573"/>
-              <a:gd name="connsiteX19" fmla="*/ 2972043 w 3293367"/>
-              <a:gd name="connsiteY19" fmla="*/ 2006528 h 3240573"/>
-              <a:gd name="connsiteX20" fmla="*/ 2950440 w 3293367"/>
-              <a:gd name="connsiteY20" fmla="*/ 2043890 h 3240573"/>
-              <a:gd name="connsiteX21" fmla="*/ 2951200 w 3293367"/>
-              <a:gd name="connsiteY21" fmla="*/ 2044209 h 3240573"/>
-              <a:gd name="connsiteX22" fmla="*/ 2989324 w 3293367"/>
-              <a:gd name="connsiteY22" fmla="*/ 2082660 h 3240573"/>
-              <a:gd name="connsiteX23" fmla="*/ 3279247 w 3293367"/>
-              <a:gd name="connsiteY23" fmla="*/ 2584089 h 3240573"/>
-              <a:gd name="connsiteX24" fmla="*/ 3279247 w 3293367"/>
-              <a:gd name="connsiteY24" fmla="*/ 2686626 h 3240573"/>
-              <a:gd name="connsiteX25" fmla="*/ 2989324 w 3293367"/>
-              <a:gd name="connsiteY25" fmla="*/ 3188054 h 3240573"/>
-              <a:gd name="connsiteX26" fmla="*/ 2898957 w 3293367"/>
-              <a:gd name="connsiteY26" fmla="*/ 3240573 h 3240573"/>
-              <a:gd name="connsiteX27" fmla="*/ 2317855 w 3293367"/>
-              <a:gd name="connsiteY27" fmla="*/ 3240573 h 3240573"/>
-              <a:gd name="connsiteX28" fmla="*/ 2228744 w 3293367"/>
-              <a:gd name="connsiteY28" fmla="*/ 3188054 h 3240573"/>
-              <a:gd name="connsiteX29" fmla="*/ 2072563 w 3293367"/>
-              <a:gd name="connsiteY29" fmla="*/ 2919100 h 3240573"/>
-              <a:gd name="connsiteX30" fmla="*/ 2054920 w 3293367"/>
-              <a:gd name="connsiteY30" fmla="*/ 2888716 h 3240573"/>
-              <a:gd name="connsiteX31" fmla="*/ 2068802 w 3293367"/>
-              <a:gd name="connsiteY31" fmla="*/ 2888716 h 3240573"/>
-              <a:gd name="connsiteX32" fmla="*/ 2134418 w 3293367"/>
-              <a:gd name="connsiteY32" fmla="*/ 2888716 h 3240573"/>
-              <a:gd name="connsiteX33" fmla="*/ 2162922 w 3293367"/>
-              <a:gd name="connsiteY33" fmla="*/ 2937803 h 3240573"/>
-              <a:gd name="connsiteX34" fmla="*/ 2271824 w 3293367"/>
-              <a:gd name="connsiteY34" fmla="*/ 3125340 h 3240573"/>
-              <a:gd name="connsiteX35" fmla="*/ 2350824 w 3293367"/>
-              <a:gd name="connsiteY35" fmla="*/ 3171900 h 3240573"/>
-              <a:gd name="connsiteX36" fmla="*/ 2865989 w 3293367"/>
-              <a:gd name="connsiteY36" fmla="*/ 3171900 h 3240573"/>
-              <a:gd name="connsiteX37" fmla="*/ 2946100 w 3293367"/>
-              <a:gd name="connsiteY37" fmla="*/ 3125340 h 3240573"/>
-              <a:gd name="connsiteX38" fmla="*/ 3203126 w 3293367"/>
-              <a:gd name="connsiteY38" fmla="*/ 2680809 h 3240573"/>
-              <a:gd name="connsiteX39" fmla="*/ 3203126 w 3293367"/>
-              <a:gd name="connsiteY39" fmla="*/ 2589906 h 3240573"/>
-              <a:gd name="connsiteX40" fmla="*/ 2946100 w 3293367"/>
-              <a:gd name="connsiteY40" fmla="*/ 2145375 h 3240573"/>
-              <a:gd name="connsiteX41" fmla="*/ 2912303 w 3293367"/>
-              <a:gd name="connsiteY41" fmla="*/ 2111287 h 3240573"/>
-              <a:gd name="connsiteX42" fmla="*/ 2908392 w 3293367"/>
-              <a:gd name="connsiteY42" fmla="*/ 2109648 h 3240573"/>
-              <a:gd name="connsiteX43" fmla="*/ 2929357 w 3293367"/>
-              <a:gd name="connsiteY43" fmla="*/ 2073390 h 3240573"/>
-              <a:gd name="connsiteX44" fmla="*/ 2944948 w 3293367"/>
-              <a:gd name="connsiteY44" fmla="*/ 2046424 h 3240573"/>
-              <a:gd name="connsiteX45" fmla="*/ 2928777 w 3293367"/>
-              <a:gd name="connsiteY45" fmla="*/ 2039643 h 3240573"/>
-              <a:gd name="connsiteX46" fmla="*/ 2901420 w 3293367"/>
-              <a:gd name="connsiteY46" fmla="*/ 2036009 h 3240573"/>
-              <a:gd name="connsiteX47" fmla="*/ 2320317 w 3293367"/>
-              <a:gd name="connsiteY47" fmla="*/ 2036009 h 3240573"/>
-              <a:gd name="connsiteX48" fmla="*/ 2231207 w 3293367"/>
-              <a:gd name="connsiteY48" fmla="*/ 2088527 h 3240573"/>
-              <a:gd name="connsiteX49" fmla="*/ 1940028 w 3293367"/>
-              <a:gd name="connsiteY49" fmla="*/ 2589956 h 3240573"/>
-              <a:gd name="connsiteX50" fmla="*/ 1940028 w 3293367"/>
-              <a:gd name="connsiteY50" fmla="*/ 2692493 h 3240573"/>
-              <a:gd name="connsiteX51" fmla="*/ 2036139 w 3293367"/>
-              <a:gd name="connsiteY51" fmla="*/ 2858003 h 3240573"/>
-              <a:gd name="connsiteX52" fmla="*/ 2050209 w 3293367"/>
-              <a:gd name="connsiteY52" fmla="*/ 2882232 h 3240573"/>
-              <a:gd name="connsiteX53" fmla="*/ 1985031 w 3293367"/>
-              <a:gd name="connsiteY53" fmla="*/ 2882232 h 3240573"/>
-              <a:gd name="connsiteX54" fmla="*/ 939150 w 3293367"/>
-              <a:gd name="connsiteY54" fmla="*/ 2882232 h 3240573"/>
-              <a:gd name="connsiteX55" fmla="*/ 726963 w 3293367"/>
-              <a:gd name="connsiteY55" fmla="*/ 2757176 h 3240573"/>
-              <a:gd name="connsiteX56" fmla="*/ 33622 w 3293367"/>
-              <a:gd name="connsiteY56" fmla="*/ 1563194 h 3240573"/>
-              <a:gd name="connsiteX57" fmla="*/ 33622 w 3293367"/>
-              <a:gd name="connsiteY57" fmla="*/ 1319038 h 3240573"/>
-              <a:gd name="connsiteX58" fmla="*/ 726963 w 3293367"/>
-              <a:gd name="connsiteY58" fmla="*/ 125055 h 3240573"/>
-              <a:gd name="connsiteX59" fmla="*/ 939150 w 3293367"/>
-              <a:gd name="connsiteY59" fmla="*/ 0 h 3240573"/>
-            </a:gdLst>
-            <a:ahLst/>
-            <a:cxnLst>
-              <a:cxn ang="0">
-                <a:pos x="connsiteX0" y="connsiteY0"/>
-              </a:cxn>
-              <a:cxn ang="0">
-                <a:pos x="connsiteX1" y="connsiteY1"/>
-              </a:cxn>
-              <a:cxn ang="0">
-                <a:pos x="connsiteX2" y="connsiteY2"/>
-              </a:cxn>
-              <a:cxn ang="0">
-                <a:pos x="connsiteX3" y="connsiteY3"/>
-              </a:cxn>
-              <a:cxn ang="0">
-                <a:pos x="connsiteX4" y="connsiteY4"/>
-              </a:cxn>
-              <a:cxn ang="0">
-                <a:pos x="connsiteX5" y="connsiteY5"/>
-              </a:cxn>
-              <a:cxn ang="0">
-                <a:pos x="connsiteX6" y="connsiteY6"/>
-              </a:cxn>
-              <a:cxn ang="0">
-                <a:pos x="connsiteX7" y="connsiteY7"/>
-              </a:cxn>
-              <a:cxn ang="0">
-                <a:pos x="connsiteX8" y="connsiteY8"/>
-              </a:cxn>
-              <a:cxn ang="0">
-                <a:pos x="connsiteX9" y="connsiteY9"/>
-              </a:cxn>
-              <a:cxn ang="0">
-                <a:pos x="connsiteX10" y="connsiteY10"/>
-              </a:cxn>
-              <a:cxn ang="0">
-                <a:pos x="connsiteX11" y="connsiteY11"/>
-              </a:cxn>
-              <a:cxn ang="0">
-                <a:pos x="connsiteX12" y="connsiteY12"/>
-              </a:cxn>
-              <a:cxn ang="0">
-                <a:pos x="connsiteX13" y="connsiteY13"/>
-              </a:cxn>
-              <a:cxn ang="0">
-                <a:pos x="connsiteX14" y="connsiteY14"/>
-              </a:cxn>
-              <a:cxn ang="0">
-                <a:pos x="connsiteX15" y="connsiteY15"/>
-              </a:cxn>
-              <a:cxn ang="0">
-                <a:pos x="connsiteX16" y="connsiteY16"/>
-              </a:cxn>
-              <a:cxn ang="0">
-                <a:pos x="connsiteX17" y="connsiteY17"/>
-              </a:cxn>
-              <a:cxn ang="0">
-                <a:pos x="connsiteX18" y="connsiteY18"/>
-              </a:cxn>
-              <a:cxn ang="0">
-                <a:pos x="connsiteX19" y="connsiteY19"/>
-              </a:cxn>
-              <a:cxn ang="0">
-                <a:pos x="connsiteX20" y="connsiteY20"/>
-              </a:cxn>
-              <a:cxn ang="0">
-                <a:pos x="connsiteX21" y="connsiteY21"/>
-              </a:cxn>
-              <a:cxn ang="0">
-                <a:pos x="connsiteX22" y="connsiteY22"/>
-              </a:cxn>
-              <a:cxn ang="0">
-                <a:pos x="connsiteX23" y="connsiteY23"/>
-              </a:cxn>
-              <a:cxn ang="0">
-                <a:pos x="connsiteX24" y="connsiteY24"/>
-              </a:cxn>
-              <a:cxn ang="0">
-                <a:pos x="connsiteX25" y="connsiteY25"/>
-              </a:cxn>
-              <a:cxn ang="0">
-                <a:pos x="connsiteX26" y="connsiteY26"/>
-              </a:cxn>
-              <a:cxn ang="0">
-                <a:pos x="connsiteX27" y="connsiteY27"/>
-              </a:cxn>
-              <a:cxn ang="0">
-                <a:pos x="connsiteX28" y="connsiteY28"/>
-              </a:cxn>
-              <a:cxn ang="0">
-                <a:pos x="connsiteX29" y="connsiteY29"/>
-              </a:cxn>
-              <a:cxn ang="0">
-                <a:pos x="connsiteX30" y="connsiteY30"/>
-              </a:cxn>
-              <a:cxn ang="0">
-                <a:pos x="connsiteX31" y="connsiteY31"/>
-              </a:cxn>
-              <a:cxn ang="0">
-                <a:pos x="connsiteX32" y="connsiteY32"/>
-              </a:cxn>
-              <a:cxn ang="0">
-                <a:pos x="connsiteX33" y="connsiteY33"/>
-              </a:cxn>
-              <a:cxn ang="0">
-                <a:pos x="connsiteX34" y="connsiteY34"/>
-              </a:cxn>
-              <a:cxn ang="0">
-                <a:pos x="connsiteX35" y="connsiteY35"/>
-              </a:cxn>
-              <a:cxn ang="0">
-                <a:pos x="connsiteX36" y="connsiteY36"/>
-              </a:cxn>
-              <a:cxn ang="0">
-                <a:pos x="connsiteX37" y="connsiteY37"/>
-              </a:cxn>
-              <a:cxn ang="0">
-                <a:pos x="connsiteX38" y="connsiteY38"/>
-              </a:cxn>
-              <a:cxn ang="0">
-                <a:pos x="connsiteX39" y="connsiteY39"/>
-              </a:cxn>
-              <a:cxn ang="0">
-                <a:pos x="connsiteX40" y="connsiteY40"/>
-              </a:cxn>
-              <a:cxn ang="0">
-                <a:pos x="connsiteX41" y="connsiteY41"/>
-              </a:cxn>
-              <a:cxn ang="0">
-                <a:pos x="connsiteX42" y="connsiteY42"/>
-              </a:cxn>
-              <a:cxn ang="0">
-                <a:pos x="connsiteX43" y="connsiteY43"/>
-              </a:cxn>
-              <a:cxn ang="0">
-                <a:pos x="connsiteX44" y="connsiteY44"/>
-              </a:cxn>
-              <a:cxn ang="0">
-                <a:pos x="connsiteX45" y="connsiteY45"/>
-              </a:cxn>
-              <a:cxn ang="0">
-                <a:pos x="connsiteX46" y="connsiteY46"/>
-              </a:cxn>
-              <a:cxn ang="0">
-                <a:pos x="connsiteX47" y="connsiteY47"/>
-              </a:cxn>
-              <a:cxn ang="0">
-                <a:pos x="connsiteX48" y="connsiteY48"/>
-              </a:cxn>
-              <a:cxn ang="0">
-                <a:pos x="connsiteX49" y="connsiteY49"/>
-              </a:cxn>
-              <a:cxn ang="0">
-                <a:pos x="connsiteX50" y="connsiteY50"/>
-              </a:cxn>
-              <a:cxn ang="0">
-                <a:pos x="connsiteX51" y="connsiteY51"/>
-              </a:cxn>
-              <a:cxn ang="0">
-                <a:pos x="connsiteX52" y="connsiteY52"/>
-              </a:cxn>
-              <a:cxn ang="0">
-                <a:pos x="connsiteX53" y="connsiteY53"/>
-              </a:cxn>
-              <a:cxn ang="0">
-                <a:pos x="connsiteX54" y="connsiteY54"/>
-              </a:cxn>
-              <a:cxn ang="0">
-                <a:pos x="connsiteX55" y="connsiteY55"/>
-              </a:cxn>
-              <a:cxn ang="0">
-                <a:pos x="connsiteX56" y="connsiteY56"/>
-              </a:cxn>
-              <a:cxn ang="0">
-                <a:pos x="connsiteX57" y="connsiteY57"/>
-              </a:cxn>
-              <a:cxn ang="0">
-                <a:pos x="connsiteX58" y="connsiteY58"/>
-              </a:cxn>
-              <a:cxn ang="0">
-                <a:pos x="connsiteX59" y="connsiteY59"/>
-              </a:cxn>
-            </a:cxnLst>
-            <a:rect l="l" t="t" r="r" b="b"/>
-            <a:pathLst>
-              <a:path w="3293367" h="3240573">
-                <a:moveTo>
-                  <a:pt x="2353286" y="2104683"/>
-                </a:moveTo>
-                <a:cubicBezTo>
-                  <a:pt x="2353286" y="2104683"/>
-                  <a:pt x="2353286" y="2104683"/>
-                  <a:pt x="2868450" y="2104683"/>
-                </a:cubicBezTo>
-                <a:cubicBezTo>
-                  <a:pt x="2876795" y="2104683"/>
-                  <a:pt x="2884932" y="2105791"/>
-                  <a:pt x="2892703" y="2107904"/>
-                </a:cubicBezTo>
-                <a:lnTo>
-                  <a:pt x="2909383" y="2114898"/>
-                </a:lnTo>
-                <a:lnTo>
-                  <a:pt x="2899189" y="2132529"/>
-                </a:lnTo>
-                <a:cubicBezTo>
-                  <a:pt x="2807017" y="2291942"/>
-                  <a:pt x="2689037" y="2495992"/>
-                  <a:pt x="2538022" y="2757176"/>
-                </a:cubicBezTo>
-                <a:cubicBezTo>
-                  <a:pt x="2493195" y="2834591"/>
-                  <a:pt x="2412503" y="2882232"/>
-                  <a:pt x="2322847" y="2882232"/>
-                </a:cubicBezTo>
-                <a:cubicBezTo>
-                  <a:pt x="2322847" y="2882232"/>
-                  <a:pt x="2322847" y="2882232"/>
-                  <a:pt x="2149884" y="2882232"/>
-                </a:cubicBezTo>
-                <a:lnTo>
-                  <a:pt x="2129707" y="2882232"/>
-                </a:lnTo>
-                <a:lnTo>
-                  <a:pt x="2110453" y="2849077"/>
-                </a:lnTo>
-                <a:cubicBezTo>
-                  <a:pt x="2083644" y="2802909"/>
-                  <a:pt x="2052449" y="2749188"/>
-                  <a:pt x="2016148" y="2686675"/>
-                </a:cubicBezTo>
-                <a:cubicBezTo>
-                  <a:pt x="1999459" y="2658961"/>
-                  <a:pt x="1999459" y="2623488"/>
-                  <a:pt x="2016148" y="2595774"/>
-                </a:cubicBezTo>
-                <a:cubicBezTo>
-                  <a:pt x="2016148" y="2595774"/>
-                  <a:pt x="2016148" y="2595774"/>
-                  <a:pt x="2274287" y="2151242"/>
-                </a:cubicBezTo>
-                <a:cubicBezTo>
-                  <a:pt x="2289865" y="2122420"/>
-                  <a:pt x="2321018" y="2104683"/>
-                  <a:pt x="2353286" y="2104683"/>
-                </a:cubicBezTo>
-                <a:close/>
-                <a:moveTo>
-                  <a:pt x="939150" y="0"/>
-                </a:moveTo>
-                <a:cubicBezTo>
-                  <a:pt x="939150" y="0"/>
-                  <a:pt x="939150" y="0"/>
-                  <a:pt x="2322847" y="0"/>
-                </a:cubicBezTo>
-                <a:cubicBezTo>
-                  <a:pt x="2412503" y="0"/>
-                  <a:pt x="2493195" y="47640"/>
-                  <a:pt x="2538022" y="125055"/>
-                </a:cubicBezTo>
-                <a:cubicBezTo>
-                  <a:pt x="2538022" y="125055"/>
-                  <a:pt x="2538022" y="125055"/>
-                  <a:pt x="3228376" y="1319038"/>
-                </a:cubicBezTo>
-                <a:cubicBezTo>
-                  <a:pt x="3273205" y="1393476"/>
-                  <a:pt x="3273205" y="1488756"/>
-                  <a:pt x="3228376" y="1563194"/>
-                </a:cubicBezTo>
-                <a:cubicBezTo>
-                  <a:pt x="3228376" y="1563194"/>
-                  <a:pt x="3228376" y="1563194"/>
-                  <a:pt x="2972043" y="2006528"/>
-                </a:cubicBezTo>
-                <a:lnTo>
-                  <a:pt x="2950440" y="2043890"/>
-                </a:lnTo>
-                <a:lnTo>
-                  <a:pt x="2951200" y="2044209"/>
-                </a:lnTo>
-                <a:cubicBezTo>
-                  <a:pt x="2966732" y="2053275"/>
-                  <a:pt x="2979910" y="2066404"/>
-                  <a:pt x="2989324" y="2082660"/>
-                </a:cubicBezTo>
-                <a:cubicBezTo>
-                  <a:pt x="2989324" y="2082660"/>
-                  <a:pt x="2989324" y="2082660"/>
-                  <a:pt x="3279247" y="2584089"/>
-                </a:cubicBezTo>
-                <a:cubicBezTo>
-                  <a:pt x="3298074" y="2615350"/>
-                  <a:pt x="3298074" y="2655364"/>
-                  <a:pt x="3279247" y="2686626"/>
-                </a:cubicBezTo>
-                <a:cubicBezTo>
-                  <a:pt x="3279247" y="2686626"/>
-                  <a:pt x="3279247" y="2686626"/>
-                  <a:pt x="2989324" y="3188054"/>
-                </a:cubicBezTo>
-                <a:cubicBezTo>
-                  <a:pt x="2970497" y="3220565"/>
-                  <a:pt x="2936610" y="3240573"/>
-                  <a:pt x="2898957" y="3240573"/>
-                </a:cubicBezTo>
-                <a:cubicBezTo>
-                  <a:pt x="2898957" y="3240573"/>
-                  <a:pt x="2898957" y="3240573"/>
-                  <a:pt x="2317855" y="3240573"/>
-                </a:cubicBezTo>
-                <a:cubicBezTo>
-                  <a:pt x="2281457" y="3240573"/>
-                  <a:pt x="2246316" y="3220565"/>
-                  <a:pt x="2228744" y="3188054"/>
-                </a:cubicBezTo>
-                <a:cubicBezTo>
-                  <a:pt x="2228744" y="3188054"/>
-                  <a:pt x="2228744" y="3188054"/>
-                  <a:pt x="2072563" y="2919100"/>
-                </a:cubicBezTo>
-                <a:lnTo>
-                  <a:pt x="2054920" y="2888716"/>
-                </a:lnTo>
-                <a:lnTo>
-                  <a:pt x="2068802" y="2888716"/>
-                </a:lnTo>
-                <a:lnTo>
-                  <a:pt x="2134418" y="2888716"/>
-                </a:lnTo>
-                <a:lnTo>
-                  <a:pt x="2162922" y="2937803"/>
-                </a:lnTo>
-                <a:cubicBezTo>
-                  <a:pt x="2271824" y="3125340"/>
-                  <a:pt x="2271824" y="3125340"/>
-                  <a:pt x="2271824" y="3125340"/>
-                </a:cubicBezTo>
-                <a:cubicBezTo>
-                  <a:pt x="2287402" y="3154162"/>
-                  <a:pt x="2318557" y="3171900"/>
-                  <a:pt x="2350824" y="3171900"/>
-                </a:cubicBezTo>
-                <a:cubicBezTo>
-                  <a:pt x="2865989" y="3171900"/>
-                  <a:pt x="2865989" y="3171900"/>
-                  <a:pt x="2865989" y="3171900"/>
-                </a:cubicBezTo>
-                <a:cubicBezTo>
-                  <a:pt x="2899368" y="3171900"/>
-                  <a:pt x="2929410" y="3154162"/>
-                  <a:pt x="2946100" y="3125340"/>
-                </a:cubicBezTo>
-                <a:cubicBezTo>
-                  <a:pt x="3203126" y="2680809"/>
-                  <a:pt x="3203126" y="2680809"/>
-                  <a:pt x="3203126" y="2680809"/>
-                </a:cubicBezTo>
-                <a:cubicBezTo>
-                  <a:pt x="3219816" y="2653094"/>
-                  <a:pt x="3219816" y="2617620"/>
-                  <a:pt x="3203126" y="2589906"/>
-                </a:cubicBezTo>
-                <a:cubicBezTo>
-                  <a:pt x="2946100" y="2145375"/>
-                  <a:pt x="2946100" y="2145375"/>
-                  <a:pt x="2946100" y="2145375"/>
-                </a:cubicBezTo>
-                <a:cubicBezTo>
-                  <a:pt x="2937755" y="2130963"/>
-                  <a:pt x="2926072" y="2119323"/>
-                  <a:pt x="2912303" y="2111287"/>
-                </a:cubicBezTo>
-                <a:lnTo>
-                  <a:pt x="2908392" y="2109648"/>
-                </a:lnTo>
-                <a:lnTo>
-                  <a:pt x="2929357" y="2073390"/>
-                </a:lnTo>
-                <a:lnTo>
-                  <a:pt x="2944948" y="2046424"/>
-                </a:lnTo>
-                <a:lnTo>
-                  <a:pt x="2928777" y="2039643"/>
-                </a:lnTo>
-                <a:cubicBezTo>
-                  <a:pt x="2920010" y="2037259"/>
-                  <a:pt x="2910833" y="2036009"/>
-                  <a:pt x="2901420" y="2036009"/>
-                </a:cubicBezTo>
-                <a:cubicBezTo>
-                  <a:pt x="2320317" y="2036009"/>
-                  <a:pt x="2320317" y="2036009"/>
-                  <a:pt x="2320317" y="2036009"/>
-                </a:cubicBezTo>
-                <a:cubicBezTo>
-                  <a:pt x="2283920" y="2036009"/>
-                  <a:pt x="2248778" y="2056016"/>
-                  <a:pt x="2231207" y="2088527"/>
-                </a:cubicBezTo>
-                <a:cubicBezTo>
-                  <a:pt x="1940028" y="2589956"/>
-                  <a:pt x="1940028" y="2589956"/>
-                  <a:pt x="1940028" y="2589956"/>
-                </a:cubicBezTo>
-                <a:cubicBezTo>
-                  <a:pt x="1921201" y="2621217"/>
-                  <a:pt x="1921201" y="2661231"/>
-                  <a:pt x="1940028" y="2692493"/>
-                </a:cubicBezTo>
-                <a:cubicBezTo>
-                  <a:pt x="1976425" y="2755171"/>
-                  <a:pt x="2008272" y="2810015"/>
-                  <a:pt x="2036139" y="2858003"/>
-                </a:cubicBezTo>
-                <a:lnTo>
-                  <a:pt x="2050209" y="2882232"/>
-                </a:lnTo>
-                <a:lnTo>
-                  <a:pt x="1985031" y="2882232"/>
-                </a:lnTo>
-                <a:cubicBezTo>
-                  <a:pt x="1782341" y="2882232"/>
-                  <a:pt x="1458037" y="2882232"/>
-                  <a:pt x="939150" y="2882232"/>
-                </a:cubicBezTo>
-                <a:cubicBezTo>
-                  <a:pt x="852483" y="2882232"/>
-                  <a:pt x="768803" y="2834591"/>
-                  <a:pt x="726963" y="2757176"/>
-                </a:cubicBezTo>
-                <a:cubicBezTo>
-                  <a:pt x="726963" y="2757176"/>
-                  <a:pt x="726963" y="2757176"/>
-                  <a:pt x="33622" y="1563194"/>
-                </a:cubicBezTo>
-                <a:cubicBezTo>
-                  <a:pt x="-11207" y="1488756"/>
-                  <a:pt x="-11207" y="1393476"/>
-                  <a:pt x="33622" y="1319038"/>
-                </a:cubicBezTo>
-                <a:cubicBezTo>
-                  <a:pt x="33622" y="1319038"/>
-                  <a:pt x="33622" y="1319038"/>
-                  <a:pt x="726963" y="125055"/>
-                </a:cubicBezTo>
-                <a:cubicBezTo>
-                  <a:pt x="768803" y="47640"/>
-                  <a:pt x="852483" y="0"/>
-                  <a:pt x="939150" y="0"/>
-                </a:cubicBezTo>
-                <a:close/>
-              </a:path>
-            </a:pathLst>
-          </a:custGeom>
-          <a:solidFill>
-            <a:schemeClr val="tx1">
-              <a:lumMod val="50000"/>
-              <a:lumOff val="50000"/>
-              <a:alpha val="15000"/>
-            </a:schemeClr>
-          </a:solidFill>
-          <a:ln>
-            <a:noFill/>
-          </a:ln>
-        </p:spPr>
-        <p:style>
-          <a:lnRef idx="2">
-            <a:schemeClr val="accent1">
-              <a:shade val="50000"/>
-            </a:schemeClr>
-          </a:lnRef>
-          <a:fillRef idx="1">
-            <a:schemeClr val="accent1"/>
-          </a:fillRef>
-          <a:effectRef idx="0">
-            <a:schemeClr val="accent1"/>
-          </a:effectRef>
-          <a:fontRef idx="minor">
-            <a:schemeClr val="lt1"/>
-          </a:fontRef>
-        </p:style>
-        <p:txBody>
-          <a:bodyPr wrap="square" rtlCol="0" anchor="ctr">
-            <a:noAutofit/>
-          </a:bodyPr>
-          <a:lstStyle/>
-          <a:p>
-            <a:pPr algn="ctr"/>
-            <a:endParaRPr lang="en-US" dirty="0"/>
-          </a:p>
-        </p:txBody>
-      </p:sp>
-      <p:sp>
-        <p:nvSpPr>
-          <p:cNvPr id="20" name="Freeform: Shape 19">
-            <a:extLst>
-              <a:ext uri="{FF2B5EF4-FFF2-40B4-BE49-F238E27FC236}">
-                <a16:creationId xmlns:a16="http://schemas.microsoft.com/office/drawing/2014/main" id="{D4340B2E-01FD-4F5D-9C4D-AD3923AD20BA}"/>
-              </a:ext>
-              <a:ext uri="{C183D7F6-B498-43B3-948B-1728B52AA6E4}">
-                <adec:decorative xmlns="" xmlns:adec="http://schemas.microsoft.com/office/drawing/2017/decorative" val="1"/>
-              </a:ext>
-            </a:extLst>
-          </p:cNvPr>
-          <p:cNvSpPr>
-            <a:spLocks noGrp="1" noRot="1" noChangeAspect="1" noMove="1" noResize="1" noEditPoints="1" noAdjustHandles="1" noChangeArrowheads="1" noChangeShapeType="1" noTextEdit="1"/>
-          </p:cNvSpPr>
-          <p:nvPr>
-            <p:extLst>
-              <p:ext uri="{386F3935-93C4-4BCD-93E2-E3B085C9AB24}">
-                <p16:designElem xmlns:p16="http://schemas.microsoft.com/office/powerpoint/2015/main" val="1"/>
-              </p:ext>
-            </p:extLst>
-          </p:nvPr>
-        </p:nvSpPr>
-        <p:spPr>
-          <a:xfrm>
-            <a:off x="8691733" y="843530"/>
-            <a:ext cx="3309879" cy="2983688"/>
-          </a:xfrm>
-          <a:custGeom>
-            <a:avLst/>
-            <a:gdLst>
-              <a:gd name="connsiteX0" fmla="*/ 944317 w 3309879"/>
-              <a:gd name="connsiteY0" fmla="*/ 0 h 2983688"/>
-              <a:gd name="connsiteX1" fmla="*/ 2368743 w 3309879"/>
-              <a:gd name="connsiteY1" fmla="*/ 0 h 2983688"/>
-              <a:gd name="connsiteX2" fmla="*/ 2572231 w 3309879"/>
-              <a:gd name="connsiteY2" fmla="*/ 116416 h 2983688"/>
-              <a:gd name="connsiteX3" fmla="*/ 3284443 w 3309879"/>
-              <a:gd name="connsiteY3" fmla="*/ 1371117 h 2983688"/>
-              <a:gd name="connsiteX4" fmla="*/ 3284443 w 3309879"/>
-              <a:gd name="connsiteY4" fmla="*/ 1612573 h 2983688"/>
-              <a:gd name="connsiteX5" fmla="*/ 2572231 w 3309879"/>
-              <a:gd name="connsiteY5" fmla="*/ 2867272 h 2983688"/>
-              <a:gd name="connsiteX6" fmla="*/ 2368743 w 3309879"/>
-              <a:gd name="connsiteY6" fmla="*/ 2983688 h 2983688"/>
-              <a:gd name="connsiteX7" fmla="*/ 944317 w 3309879"/>
-              <a:gd name="connsiteY7" fmla="*/ 2983688 h 2983688"/>
-              <a:gd name="connsiteX8" fmla="*/ 740830 w 3309879"/>
-              <a:gd name="connsiteY8" fmla="*/ 2867272 h 2983688"/>
-              <a:gd name="connsiteX9" fmla="*/ 28617 w 3309879"/>
-              <a:gd name="connsiteY9" fmla="*/ 1612573 h 2983688"/>
-              <a:gd name="connsiteX10" fmla="*/ 28617 w 3309879"/>
-              <a:gd name="connsiteY10" fmla="*/ 1371117 h 2983688"/>
-              <a:gd name="connsiteX11" fmla="*/ 740830 w 3309879"/>
-              <a:gd name="connsiteY11" fmla="*/ 116416 h 2983688"/>
-              <a:gd name="connsiteX12" fmla="*/ 944317 w 3309879"/>
-              <a:gd name="connsiteY12" fmla="*/ 0 h 2983688"/>
-            </a:gdLst>
-            <a:ahLst/>
-            <a:cxnLst>
-              <a:cxn ang="0">
-                <a:pos x="connsiteX0" y="connsiteY0"/>
-              </a:cxn>
-              <a:cxn ang="0">
-                <a:pos x="connsiteX1" y="connsiteY1"/>
-              </a:cxn>
-              <a:cxn ang="0">
-                <a:pos x="connsiteX2" y="connsiteY2"/>
-              </a:cxn>
-              <a:cxn ang="0">
-                <a:pos x="connsiteX3" y="connsiteY3"/>
-              </a:cxn>
-              <a:cxn ang="0">
-                <a:pos x="connsiteX4" y="connsiteY4"/>
-              </a:cxn>
-              <a:cxn ang="0">
-                <a:pos x="connsiteX5" y="connsiteY5"/>
-              </a:cxn>
-              <a:cxn ang="0">
-                <a:pos x="connsiteX6" y="connsiteY6"/>
-              </a:cxn>
-              <a:cxn ang="0">
-                <a:pos x="connsiteX7" y="connsiteY7"/>
-              </a:cxn>
-              <a:cxn ang="0">
-                <a:pos x="connsiteX8" y="connsiteY8"/>
-              </a:cxn>
-              <a:cxn ang="0">
-                <a:pos x="connsiteX9" y="connsiteY9"/>
-              </a:cxn>
-              <a:cxn ang="0">
-                <a:pos x="connsiteX10" y="connsiteY10"/>
-              </a:cxn>
-              <a:cxn ang="0">
-                <a:pos x="connsiteX11" y="connsiteY11"/>
-              </a:cxn>
-              <a:cxn ang="0">
-                <a:pos x="connsiteX12" y="connsiteY12"/>
-              </a:cxn>
-            </a:cxnLst>
-            <a:rect l="l" t="t" r="r" b="b"/>
-            <a:pathLst>
-              <a:path w="3309879" h="2983688">
-                <a:moveTo>
-                  <a:pt x="944317" y="0"/>
-                </a:moveTo>
-                <a:cubicBezTo>
-                  <a:pt x="2368743" y="0"/>
-                  <a:pt x="2368743" y="0"/>
-                  <a:pt x="2368743" y="0"/>
-                </a:cubicBezTo>
-                <a:cubicBezTo>
-                  <a:pt x="2440811" y="0"/>
-                  <a:pt x="2534078" y="51740"/>
-                  <a:pt x="2572231" y="116416"/>
-                </a:cubicBezTo>
-                <a:cubicBezTo>
-                  <a:pt x="3284443" y="1371117"/>
-                  <a:pt x="3284443" y="1371117"/>
-                  <a:pt x="3284443" y="1371117"/>
-                </a:cubicBezTo>
-                <a:cubicBezTo>
-                  <a:pt x="3318358" y="1440104"/>
-                  <a:pt x="3318358" y="1543584"/>
-                  <a:pt x="3284443" y="1612573"/>
-                </a:cubicBezTo>
-                <a:cubicBezTo>
-                  <a:pt x="2572231" y="2867272"/>
-                  <a:pt x="2572231" y="2867272"/>
-                  <a:pt x="2572231" y="2867272"/>
-                </a:cubicBezTo>
-                <a:cubicBezTo>
-                  <a:pt x="2534078" y="2931949"/>
-                  <a:pt x="2440811" y="2983688"/>
-                  <a:pt x="2368743" y="2983688"/>
-                </a:cubicBezTo>
-                <a:lnTo>
-                  <a:pt x="944317" y="2983688"/>
-                </a:lnTo>
-                <a:cubicBezTo>
-                  <a:pt x="868010" y="2983688"/>
-                  <a:pt x="774745" y="2931949"/>
-                  <a:pt x="740830" y="2867272"/>
-                </a:cubicBezTo>
-                <a:cubicBezTo>
-                  <a:pt x="28617" y="1612573"/>
-                  <a:pt x="28617" y="1612573"/>
-                  <a:pt x="28617" y="1612573"/>
-                </a:cubicBezTo>
-                <a:cubicBezTo>
-                  <a:pt x="-9538" y="1543584"/>
-                  <a:pt x="-9538" y="1440104"/>
-                  <a:pt x="28617" y="1371117"/>
-                </a:cubicBezTo>
-                <a:cubicBezTo>
-                  <a:pt x="740830" y="116416"/>
-                  <a:pt x="740830" y="116416"/>
-                  <a:pt x="740830" y="116416"/>
-                </a:cubicBezTo>
-                <a:cubicBezTo>
-                  <a:pt x="774745" y="51740"/>
-                  <a:pt x="868010" y="0"/>
-                  <a:pt x="944317" y="0"/>
-                </a:cubicBezTo>
-                <a:close/>
-              </a:path>
-            </a:pathLst>
-          </a:custGeom>
-          <a:solidFill>
-            <a:schemeClr val="tx1">
-              <a:lumMod val="50000"/>
-              <a:lumOff val="50000"/>
-              <a:alpha val="15000"/>
-            </a:schemeClr>
-          </a:solidFill>
-          <a:ln>
-            <a:noFill/>
-          </a:ln>
-        </p:spPr>
-        <p:style>
-          <a:lnRef idx="2">
-            <a:schemeClr val="accent1">
-              <a:shade val="50000"/>
-            </a:schemeClr>
-          </a:lnRef>
-          <a:fillRef idx="1">
-            <a:schemeClr val="accent1"/>
-          </a:fillRef>
-          <a:effectRef idx="0">
-            <a:schemeClr val="accent1"/>
-          </a:effectRef>
-          <a:fontRef idx="minor">
-            <a:schemeClr val="lt1"/>
-          </a:fontRef>
-        </p:style>
-        <p:txBody>
-          <a:bodyPr wrap="square" rtlCol="0" anchor="ctr">
-            <a:noAutofit/>
-          </a:bodyPr>
-          <a:lstStyle/>
-          <a:p>
-            <a:pPr algn="ctr"/>
-            <a:endParaRPr lang="en-US" dirty="0"/>
-          </a:p>
-        </p:txBody>
-      </p:sp>
-      <p:pic>
-        <p:nvPicPr>
-          <p:cNvPr id="7" name="Graphic 6" descr="Table outline">
-            <a:extLst>
-              <a:ext uri="{FF2B5EF4-FFF2-40B4-BE49-F238E27FC236}">
-                <a16:creationId xmlns:a16="http://schemas.microsoft.com/office/drawing/2014/main" id="{0F832088-B2E2-A048-B5F5-794E1D20213C}"/>
-              </a:ext>
-            </a:extLst>
-          </p:cNvPr>
-          <p:cNvPicPr>
-            <a:picLocks noChangeAspect="1"/>
-          </p:cNvPicPr>
-          <p:nvPr/>
-        </p:nvPicPr>
-        <p:blipFill>
-          <a:blip r:embed="rId4">
-            <a:extLst>
-              <a:ext uri="{28A0092B-C50C-407E-A947-70E740481C1C}">
-                <a14:useLocalDpi xmlns:a14="http://schemas.microsoft.com/office/drawing/2010/main" val="0"/>
-              </a:ext>
-              <a:ext uri="{96DAC541-7B7A-43D3-8B79-37D633B846F1}">
-                <asvg:svgBlip xmlns="" xmlns:asvg="http://schemas.microsoft.com/office/drawing/2016/SVG/main" r:embed="rId5"/>
-              </a:ext>
-            </a:extLst>
-          </a:blip>
-          <a:stretch>
-            <a:fillRect/>
-          </a:stretch>
-        </p:blipFill>
-        <p:spPr>
-          <a:xfrm>
-            <a:off x="6255567" y="3063687"/>
-            <a:ext cx="2433099" cy="2433099"/>
-          </a:xfrm>
-          <a:prstGeom prst="rect">
-            <a:avLst/>
-          </a:prstGeom>
-        </p:spPr>
-      </p:pic>
-      <p:pic>
-        <p:nvPicPr>
-          <p:cNvPr id="5" name="Graphic 4" descr="Images outline">
-            <a:extLst>
-              <a:ext uri="{FF2B5EF4-FFF2-40B4-BE49-F238E27FC236}">
-                <a16:creationId xmlns:a16="http://schemas.microsoft.com/office/drawing/2014/main" id="{BCA8257A-8846-4546-A55F-E95BF41A0658}"/>
-              </a:ext>
-            </a:extLst>
-          </p:cNvPr>
-          <p:cNvPicPr>
-            <a:picLocks noChangeAspect="1"/>
-          </p:cNvPicPr>
-          <p:nvPr/>
-        </p:nvPicPr>
-        <p:blipFill>
-          <a:blip r:embed="rId6">
-            <a:extLst>
-              <a:ext uri="{28A0092B-C50C-407E-A947-70E740481C1C}">
-                <a14:useLocalDpi xmlns:a14="http://schemas.microsoft.com/office/drawing/2010/main" val="0"/>
-              </a:ext>
-              <a:ext uri="{96DAC541-7B7A-43D3-8B79-37D633B846F1}">
-                <asvg:svgBlip xmlns="" xmlns:asvg="http://schemas.microsoft.com/office/drawing/2016/SVG/main" r:embed="rId7"/>
-              </a:ext>
-            </a:extLst>
-          </a:blip>
-          <a:stretch>
-            <a:fillRect/>
-          </a:stretch>
-        </p:blipFill>
-        <p:spPr>
-          <a:xfrm>
-            <a:off x="9279130" y="1267832"/>
-            <a:ext cx="2135083" cy="2135083"/>
-          </a:xfrm>
-          <a:prstGeom prst="rect">
-            <a:avLst/>
-          </a:prstGeom>
-        </p:spPr>
-      </p:pic>
-    </p:spTree>
-    <p:extLst>
-      <p:ext uri="{BB962C8B-B14F-4D97-AF65-F5344CB8AC3E}">
-        <p14:creationId xmlns:p14="http://schemas.microsoft.com/office/powerpoint/2010/main" val="517217346"/>
-      </p:ext>
-    </p:extLst>
-  </p:cSld>
-  <p:clrMapOvr>
-    <a:masterClrMapping/>
-  </p:clrMapOvr>
-</p:sld>
-</file>
-
 <file path=ppt/slides/slide3.xml><?xml version="1.0" encoding="utf-8"?>
 <p:sld xmlns:a="http://schemas.openxmlformats.org/drawingml/2006/main" xmlns:r="http://schemas.openxmlformats.org/officeDocument/2006/relationships" xmlns:p="http://schemas.openxmlformats.org/presentationml/2006/main">
   <p:cSld>
@@ -7867,7 +7960,15 @@
             </a:pPr>
             <a:r>
               <a:rPr lang="en-GB" dirty="0"/>
-              <a:t>…</a:t>
+              <a:t>… </a:t>
+            </a:r>
+            <a:r>
+              <a:rPr lang="en-GB" dirty="0" err="1"/>
+              <a:t>Excersice</a:t>
+            </a:r>
+            <a:r>
+              <a:rPr lang="en-GB" dirty="0"/>
+              <a:t> 1a &amp; 1b</a:t>
             </a:r>
           </a:p>
         </p:txBody>
@@ -8021,14 +8122,13 @@
               <a:t>Impossible </a:t>
             </a:r>
             <a:r>
-              <a:rPr lang="pl-PL" dirty="0" smtClean="0"/>
+              <a:rPr lang="pl-PL" dirty="0"/>
               <a:t>averag</a:t>
             </a:r>
             <a:r>
-              <a:rPr lang="en-GB" dirty="0" smtClean="0"/>
+              <a:rPr lang="en-GB" dirty="0"/>
               <a:t>e</a:t>
             </a:r>
-            <a:endParaRPr lang="en-GB" dirty="0"/>
           </a:p>
         </p:txBody>
       </p:sp>
@@ -8059,105 +8159,61 @@
             </a:r>
             <a:r>
               <a:rPr lang="pl-PL" dirty="0"/>
-              <a:t> to </a:t>
-            </a:r>
-            <a:r>
-              <a:rPr lang="pl-PL" dirty="0" smtClean="0"/>
-              <a:t>fin</a:t>
-            </a:r>
-            <a:r>
-              <a:rPr lang="en-GB" dirty="0" smtClean="0"/>
+              <a:t> to fin</a:t>
+            </a:r>
+            <a:r>
+              <a:rPr lang="en-GB" dirty="0"/>
               <a:t>d</a:t>
             </a:r>
             <a:r>
-              <a:rPr lang="pl-PL" dirty="0" smtClean="0"/>
-              <a:t> </a:t>
-            </a:r>
-            <a:r>
               <a:rPr lang="pl-PL" dirty="0"/>
-              <a:t>the </a:t>
-            </a:r>
-            <a:r>
-              <a:rPr lang="pl-PL" dirty="0" smtClean="0"/>
-              <a:t>righ</a:t>
-            </a:r>
-            <a:r>
-              <a:rPr lang="en-GB" dirty="0" smtClean="0"/>
+              <a:t> the righ</a:t>
+            </a:r>
+            <a:r>
+              <a:rPr lang="en-GB" dirty="0"/>
               <a:t>t</a:t>
             </a:r>
             <a:r>
-              <a:rPr lang="pl-PL" dirty="0" smtClean="0"/>
-              <a:t> </a:t>
-            </a:r>
-            <a:r>
               <a:rPr lang="pl-PL" dirty="0"/>
-              <a:t>data </a:t>
-            </a:r>
-            <a:r>
-              <a:rPr lang="pl-PL" dirty="0" smtClean="0"/>
-              <a:t>tabl</a:t>
-            </a:r>
-            <a:r>
-              <a:rPr lang="en-GB" dirty="0" smtClean="0"/>
+              <a:t> data tabl</a:t>
+            </a:r>
+            <a:r>
+              <a:rPr lang="en-GB" dirty="0"/>
               <a:t>e</a:t>
             </a:r>
             <a:r>
-              <a:rPr lang="pl-PL" dirty="0" smtClean="0"/>
-              <a:t> </a:t>
-            </a:r>
-            <a:r>
               <a:rPr lang="pl-PL" dirty="0"/>
-              <a:t>and </a:t>
-            </a:r>
-            <a:r>
-              <a:rPr lang="pl-PL" dirty="0" smtClean="0"/>
-              <a:t>colum</a:t>
-            </a:r>
-            <a:r>
-              <a:rPr lang="en-GB" dirty="0" smtClean="0"/>
+              <a:t> and colum</a:t>
+            </a:r>
+            <a:r>
+              <a:rPr lang="en-GB" dirty="0"/>
               <a:t>n</a:t>
             </a:r>
             <a:endParaRPr lang="pl-PL" dirty="0"/>
           </a:p>
           <a:p>
             <a:r>
-              <a:rPr lang="pl-PL" dirty="0" smtClean="0"/>
+              <a:rPr lang="pl-PL" dirty="0"/>
               <a:t>Numerica</a:t>
             </a:r>
             <a:r>
-              <a:rPr lang="en-GB" dirty="0" smtClean="0"/>
+              <a:rPr lang="en-GB" dirty="0"/>
               <a:t>l</a:t>
             </a:r>
             <a:r>
-              <a:rPr lang="pl-PL" dirty="0" smtClean="0"/>
-              <a:t> </a:t>
-            </a:r>
-            <a:r>
               <a:rPr lang="pl-PL" dirty="0"/>
-              <a:t>data in pdf not </a:t>
-            </a:r>
-            <a:r>
-              <a:rPr lang="pl-PL" dirty="0" smtClean="0"/>
-              <a:t>suitabl</a:t>
-            </a:r>
-            <a:r>
-              <a:rPr lang="en-GB" dirty="0" smtClean="0"/>
+              <a:t> data in pdf not suitabl</a:t>
+            </a:r>
+            <a:r>
+              <a:rPr lang="en-GB" dirty="0"/>
               <a:t>e</a:t>
             </a:r>
             <a:r>
-              <a:rPr lang="pl-PL" dirty="0" smtClean="0"/>
-              <a:t> </a:t>
-            </a:r>
-            <a:r>
               <a:rPr lang="pl-PL" dirty="0"/>
-              <a:t>for </a:t>
-            </a:r>
-            <a:r>
-              <a:rPr lang="pl-PL" dirty="0" smtClean="0"/>
-              <a:t>calculation</a:t>
-            </a:r>
-            <a:r>
-              <a:rPr lang="en-GB" dirty="0" smtClean="0"/>
+              <a:t> for calculation</a:t>
+            </a:r>
+            <a:r>
+              <a:rPr lang="en-GB" dirty="0"/>
               <a:t>s</a:t>
             </a:r>
             <a:endParaRPr lang="pl-PL" dirty="0"/>
@@ -8767,7 +8823,7 @@
               <a:buChar char="•"/>
             </a:pPr>
             <a:r>
-              <a:rPr lang="en-GB" sz="2000" dirty="0" smtClean="0">
+              <a:rPr lang="en-GB" sz="2000" dirty="0">
                 <a:solidFill>
                   <a:srgbClr val="0070C0"/>
                 </a:solidFill>
@@ -8775,20 +8831,12 @@
               <a:t>persistent identifiers pointing </a:t>
             </a:r>
             <a:r>
-              <a:rPr lang="pl-PL" sz="2000" dirty="0" smtClean="0">
-                <a:solidFill>
-                  <a:srgbClr val="0070C0"/>
-                </a:solidFill>
-              </a:rPr>
-              <a:t>to </a:t>
-            </a:r>
-            <a:r>
               <a:rPr lang="pl-PL" sz="2000" dirty="0">
                 <a:solidFill>
                   <a:srgbClr val="0070C0"/>
                 </a:solidFill>
               </a:rPr>
-              <a:t>the data</a:t>
+              <a:t>to the data</a:t>
             </a:r>
             <a:endParaRPr lang="pl-PL" sz="2000" dirty="0">
               <a:solidFill>
@@ -8803,7 +8851,7 @@
               <a:buChar char="•"/>
             </a:pPr>
             <a:r>
-              <a:rPr lang="en-GB" sz="2000" dirty="0" smtClean="0">
+              <a:rPr lang="en-GB" sz="2000" dirty="0">
                 <a:solidFill>
                   <a:srgbClr val="0070C0"/>
                 </a:solidFill>
@@ -8811,20 +8859,12 @@
               <a:t>descriptions that allow discovery</a:t>
             </a:r>
             <a:r>
-              <a:rPr lang="pl-PL" sz="2000" dirty="0" smtClean="0">
-                <a:solidFill>
-                  <a:srgbClr val="0070C0"/>
-                </a:solidFill>
-              </a:rPr>
-              <a:t> </a:t>
-            </a:r>
-            <a:r>
               <a:rPr lang="pl-PL" sz="2000" dirty="0">
                 <a:solidFill>
                   <a:srgbClr val="0070C0"/>
                 </a:solidFill>
               </a:rPr>
-              <a:t>by</a:t>
+              <a:t> by</a:t>
             </a:r>
             <a:r>
               <a:rPr lang="en-GB" sz="2000" dirty="0">
@@ -8893,20 +8933,12 @@
               <a:buChar char="•"/>
             </a:pPr>
             <a:r>
-              <a:rPr lang="en-GB" sz="2000" dirty="0" smtClean="0">
-                <a:solidFill>
-                  <a:srgbClr val="0070C0"/>
-                </a:solidFill>
-              </a:rPr>
-              <a:t>metadata </a:t>
-            </a:r>
-            <a:r>
               <a:rPr lang="en-GB" sz="2000" dirty="0">
                 <a:solidFill>
                   <a:srgbClr val="0070C0"/>
                 </a:solidFill>
               </a:rPr>
-              <a:t>available even when the data are no</a:t>
+              <a:t>metadata available even when the data are no</a:t>
             </a:r>
             <a:r>
               <a:rPr lang="pl-PL" sz="2000" dirty="0">

</xml_diff>